<commit_message>
Fixed typo in docs
</commit_message>
<xml_diff>
--- a/Documents/EclipseOpenMPTraining.pptx
+++ b/Documents/EclipseOpenMPTraining.pptx
@@ -135,6 +135,11 @@
       </a:defRPr>
     </a:lvl9pPr>
   </p:defaultTextStyle>
+  <p:extLst>
+    <p:ext uri="{EFAFB233-063F-42B5-8137-9DF3F51BA10A}">
+      <p15:sldGuideLst xmlns:p15="http://schemas.microsoft.com/office/powerpoint/2012/main"/>
+    </p:ext>
+  </p:extLst>
 </p:presentation>
 </file>
 
@@ -6125,7 +6130,19 @@
           <a:p>
             <a:r>
               <a:rPr lang="en-US" dirty="0" smtClean="0"/>
-              <a:t>Change Path: Got to Advanced System Settings </a:t>
+              <a:t>Change Path</a:t>
+            </a:r>
+            <a:r>
+              <a:rPr lang="en-US" smtClean="0"/>
+              <a:t>: </a:t>
+            </a:r>
+            <a:r>
+              <a:rPr lang="en-US" smtClean="0"/>
+              <a:t>Go </a:t>
+            </a:r>
+            <a:r>
+              <a:rPr lang="en-US" dirty="0" smtClean="0"/>
+              <a:t>to Advanced System Settings </a:t>
             </a:r>
             <a:endParaRPr lang="en-US" dirty="0"/>
           </a:p>

</xml_diff>

<commit_message>
Updated docs with plugin installation details
</commit_message>
<xml_diff>
--- a/Documents/EclipseOpenMPTraining.pptx
+++ b/Documents/EclipseOpenMPTraining.pptx
@@ -5,7 +5,7 @@
     <p:sldMasterId id="2147483648" r:id="rId1"/>
   </p:sldMasterIdLst>
   <p:notesMasterIdLst>
-    <p:notesMasterId r:id="rId31"/>
+    <p:notesMasterId r:id="rId50"/>
   </p:notesMasterIdLst>
   <p:sldIdLst>
     <p:sldId id="256" r:id="rId2"/>
@@ -24,19 +24,38 @@
     <p:sldId id="269" r:id="rId15"/>
     <p:sldId id="270" r:id="rId16"/>
     <p:sldId id="271" r:id="rId17"/>
-    <p:sldId id="272" r:id="rId18"/>
-    <p:sldId id="273" r:id="rId19"/>
-    <p:sldId id="274" r:id="rId20"/>
-    <p:sldId id="275" r:id="rId21"/>
-    <p:sldId id="276" r:id="rId22"/>
-    <p:sldId id="277" r:id="rId23"/>
-    <p:sldId id="278" r:id="rId24"/>
-    <p:sldId id="279" r:id="rId25"/>
-    <p:sldId id="280" r:id="rId26"/>
-    <p:sldId id="281" r:id="rId27"/>
-    <p:sldId id="282" r:id="rId28"/>
-    <p:sldId id="283" r:id="rId29"/>
-    <p:sldId id="284" r:id="rId30"/>
+    <p:sldId id="286" r:id="rId18"/>
+    <p:sldId id="287" r:id="rId19"/>
+    <p:sldId id="288" r:id="rId20"/>
+    <p:sldId id="289" r:id="rId21"/>
+    <p:sldId id="290" r:id="rId22"/>
+    <p:sldId id="291" r:id="rId23"/>
+    <p:sldId id="292" r:id="rId24"/>
+    <p:sldId id="304" r:id="rId25"/>
+    <p:sldId id="272" r:id="rId26"/>
+    <p:sldId id="273" r:id="rId27"/>
+    <p:sldId id="274" r:id="rId28"/>
+    <p:sldId id="275" r:id="rId29"/>
+    <p:sldId id="276" r:id="rId30"/>
+    <p:sldId id="277" r:id="rId31"/>
+    <p:sldId id="278" r:id="rId32"/>
+    <p:sldId id="279" r:id="rId33"/>
+    <p:sldId id="280" r:id="rId34"/>
+    <p:sldId id="281" r:id="rId35"/>
+    <p:sldId id="282" r:id="rId36"/>
+    <p:sldId id="283" r:id="rId37"/>
+    <p:sldId id="284" r:id="rId38"/>
+    <p:sldId id="299" r:id="rId39"/>
+    <p:sldId id="300" r:id="rId40"/>
+    <p:sldId id="301" r:id="rId41"/>
+    <p:sldId id="302" r:id="rId42"/>
+    <p:sldId id="303" r:id="rId43"/>
+    <p:sldId id="293" r:id="rId44"/>
+    <p:sldId id="294" r:id="rId45"/>
+    <p:sldId id="295" r:id="rId46"/>
+    <p:sldId id="296" r:id="rId47"/>
+    <p:sldId id="297" r:id="rId48"/>
+    <p:sldId id="298" r:id="rId49"/>
   </p:sldIdLst>
   <p:sldSz cx="12192000" cy="6858000"/>
   <p:notesSz cx="6858000" cy="9144000"/>
@@ -225,7 +244,7 @@
           <a:p>
             <a:fld id="{87A60BF5-F68E-4BFF-901F-B97B2B72EA9D}" type="datetimeFigureOut">
               <a:rPr lang="en-US" smtClean="0"/>
-              <a:t>12/18/2019</a:t>
+              <a:t>12/19/2019</a:t>
             </a:fld>
             <a:endParaRPr lang="en-US"/>
           </a:p>
@@ -558,7 +577,7 @@
           <a:p>
             <a:fld id="{66D5248A-744A-4262-96A8-69DBAC85B71E}" type="slidenum">
               <a:rPr lang="en-US" smtClean="0"/>
-              <a:t>25</a:t>
+              <a:t>33</a:t>
             </a:fld>
             <a:endParaRPr lang="en-US"/>
           </a:p>
@@ -642,7 +661,7 @@
           <a:p>
             <a:fld id="{66D5248A-744A-4262-96A8-69DBAC85B71E}" type="slidenum">
               <a:rPr lang="en-US" smtClean="0"/>
-              <a:t>26</a:t>
+              <a:t>34</a:t>
             </a:fld>
             <a:endParaRPr lang="en-US"/>
           </a:p>
@@ -726,7 +745,7 @@
           <a:p>
             <a:fld id="{66D5248A-744A-4262-96A8-69DBAC85B71E}" type="slidenum">
               <a:rPr lang="en-US" smtClean="0"/>
-              <a:t>27</a:t>
+              <a:t>35</a:t>
             </a:fld>
             <a:endParaRPr lang="en-US"/>
           </a:p>
@@ -810,7 +829,7 @@
           <a:p>
             <a:fld id="{66D5248A-744A-4262-96A8-69DBAC85B71E}" type="slidenum">
               <a:rPr lang="en-US" smtClean="0"/>
-              <a:t>28</a:t>
+              <a:t>36</a:t>
             </a:fld>
             <a:endParaRPr lang="en-US"/>
           </a:p>
@@ -894,7 +913,7 @@
           <a:p>
             <a:fld id="{66D5248A-744A-4262-96A8-69DBAC85B71E}" type="slidenum">
               <a:rPr lang="en-US" smtClean="0"/>
-              <a:t>29</a:t>
+              <a:t>37</a:t>
             </a:fld>
             <a:endParaRPr lang="en-US"/>
           </a:p>
@@ -1044,7 +1063,7 @@
           <a:p>
             <a:fld id="{78DC4FD3-668D-42DA-83CA-6276846CCCE8}" type="datetimeFigureOut">
               <a:rPr lang="en-US" smtClean="0"/>
-              <a:t>12/18/2019</a:t>
+              <a:t>12/19/2019</a:t>
             </a:fld>
             <a:endParaRPr lang="en-US"/>
           </a:p>
@@ -1214,7 +1233,7 @@
           <a:p>
             <a:fld id="{78DC4FD3-668D-42DA-83CA-6276846CCCE8}" type="datetimeFigureOut">
               <a:rPr lang="en-US" smtClean="0"/>
-              <a:t>12/18/2019</a:t>
+              <a:t>12/19/2019</a:t>
             </a:fld>
             <a:endParaRPr lang="en-US"/>
           </a:p>
@@ -1394,7 +1413,7 @@
           <a:p>
             <a:fld id="{78DC4FD3-668D-42DA-83CA-6276846CCCE8}" type="datetimeFigureOut">
               <a:rPr lang="en-US" smtClean="0"/>
-              <a:t>12/18/2019</a:t>
+              <a:t>12/19/2019</a:t>
             </a:fld>
             <a:endParaRPr lang="en-US"/>
           </a:p>
@@ -1564,7 +1583,7 @@
           <a:p>
             <a:fld id="{78DC4FD3-668D-42DA-83CA-6276846CCCE8}" type="datetimeFigureOut">
               <a:rPr lang="en-US" smtClean="0"/>
-              <a:t>12/18/2019</a:t>
+              <a:t>12/19/2019</a:t>
             </a:fld>
             <a:endParaRPr lang="en-US"/>
           </a:p>
@@ -1810,7 +1829,7 @@
           <a:p>
             <a:fld id="{78DC4FD3-668D-42DA-83CA-6276846CCCE8}" type="datetimeFigureOut">
               <a:rPr lang="en-US" smtClean="0"/>
-              <a:t>12/18/2019</a:t>
+              <a:t>12/19/2019</a:t>
             </a:fld>
             <a:endParaRPr lang="en-US"/>
           </a:p>
@@ -2042,7 +2061,7 @@
           <a:p>
             <a:fld id="{78DC4FD3-668D-42DA-83CA-6276846CCCE8}" type="datetimeFigureOut">
               <a:rPr lang="en-US" smtClean="0"/>
-              <a:t>12/18/2019</a:t>
+              <a:t>12/19/2019</a:t>
             </a:fld>
             <a:endParaRPr lang="en-US"/>
           </a:p>
@@ -2409,7 +2428,7 @@
           <a:p>
             <a:fld id="{78DC4FD3-668D-42DA-83CA-6276846CCCE8}" type="datetimeFigureOut">
               <a:rPr lang="en-US" smtClean="0"/>
-              <a:t>12/18/2019</a:t>
+              <a:t>12/19/2019</a:t>
             </a:fld>
             <a:endParaRPr lang="en-US"/>
           </a:p>
@@ -2527,7 +2546,7 @@
           <a:p>
             <a:fld id="{78DC4FD3-668D-42DA-83CA-6276846CCCE8}" type="datetimeFigureOut">
               <a:rPr lang="en-US" smtClean="0"/>
-              <a:t>12/18/2019</a:t>
+              <a:t>12/19/2019</a:t>
             </a:fld>
             <a:endParaRPr lang="en-US"/>
           </a:p>
@@ -2622,7 +2641,7 @@
           <a:p>
             <a:fld id="{78DC4FD3-668D-42DA-83CA-6276846CCCE8}" type="datetimeFigureOut">
               <a:rPr lang="en-US" smtClean="0"/>
-              <a:t>12/18/2019</a:t>
+              <a:t>12/19/2019</a:t>
             </a:fld>
             <a:endParaRPr lang="en-US"/>
           </a:p>
@@ -2899,7 +2918,7 @@
           <a:p>
             <a:fld id="{78DC4FD3-668D-42DA-83CA-6276846CCCE8}" type="datetimeFigureOut">
               <a:rPr lang="en-US" smtClean="0"/>
-              <a:t>12/18/2019</a:t>
+              <a:t>12/19/2019</a:t>
             </a:fld>
             <a:endParaRPr lang="en-US"/>
           </a:p>
@@ -3152,7 +3171,7 @@
           <a:p>
             <a:fld id="{78DC4FD3-668D-42DA-83CA-6276846CCCE8}" type="datetimeFigureOut">
               <a:rPr lang="en-US" smtClean="0"/>
-              <a:t>12/18/2019</a:t>
+              <a:t>12/19/2019</a:t>
             </a:fld>
             <a:endParaRPr lang="en-US"/>
           </a:p>
@@ -3365,7 +3384,7 @@
           <a:p>
             <a:fld id="{78DC4FD3-668D-42DA-83CA-6276846CCCE8}" type="datetimeFigureOut">
               <a:rPr lang="en-US" smtClean="0"/>
-              <a:t>12/18/2019</a:t>
+              <a:t>12/19/2019</a:t>
             </a:fld>
             <a:endParaRPr lang="en-US"/>
           </a:p>
@@ -4475,6 +4494,2055 @@
           <a:p>
             <a:r>
               <a:rPr lang="en-US" dirty="0" smtClean="0"/>
+              <a:t>Installing Logging Plug-in</a:t>
+            </a:r>
+            <a:endParaRPr lang="en-US" dirty="0"/>
+          </a:p>
+        </p:txBody>
+      </p:sp>
+      <p:sp>
+        <p:nvSpPr>
+          <p:cNvPr id="3" name="Rectangle 2"/>
+          <p:cNvSpPr/>
+          <p:nvPr/>
+        </p:nvSpPr>
+        <p:spPr>
+          <a:xfrm>
+            <a:off x="2944356" y="1676400"/>
+            <a:ext cx="5998488" cy="1002600"/>
+          </a:xfrm>
+          <a:prstGeom prst="rect">
+            <a:avLst/>
+          </a:prstGeom>
+        </p:spPr>
+        <p:style>
+          <a:lnRef idx="1">
+            <a:schemeClr val="accent2"/>
+          </a:lnRef>
+          <a:fillRef idx="2">
+            <a:schemeClr val="accent2"/>
+          </a:fillRef>
+          <a:effectRef idx="1">
+            <a:schemeClr val="accent2"/>
+          </a:effectRef>
+          <a:fontRef idx="minor">
+            <a:schemeClr val="dk1"/>
+          </a:fontRef>
+        </p:style>
+        <p:txBody>
+          <a:bodyPr wrap="square" lIns="45720" rIns="45720" rtlCol="0" anchor="ctr">
+            <a:noAutofit/>
+          </a:bodyPr>
+          <a:lstStyle/>
+          <a:p>
+            <a:pPr algn="ctr"/>
+            <a:r>
+              <a:rPr lang="en-US" dirty="0">
+                <a:latin typeface="Calibri" pitchFamily="34" charset="0"/>
+                <a:cs typeface="Calibri" pitchFamily="34" charset="0"/>
+              </a:rPr>
+              <a:t>A plug-in can possibly misbehave/slow you down</a:t>
+            </a:r>
+          </a:p>
+        </p:txBody>
+      </p:sp>
+      <p:sp>
+        <p:nvSpPr>
+          <p:cNvPr id="4" name="Rectangle 3"/>
+          <p:cNvSpPr/>
+          <p:nvPr/>
+        </p:nvSpPr>
+        <p:spPr>
+          <a:xfrm>
+            <a:off x="2944356" y="2895600"/>
+            <a:ext cx="5998488" cy="1002600"/>
+          </a:xfrm>
+          <a:prstGeom prst="rect">
+            <a:avLst/>
+          </a:prstGeom>
+        </p:spPr>
+        <p:style>
+          <a:lnRef idx="1">
+            <a:schemeClr val="accent3"/>
+          </a:lnRef>
+          <a:fillRef idx="2">
+            <a:schemeClr val="accent3"/>
+          </a:fillRef>
+          <a:effectRef idx="1">
+            <a:schemeClr val="accent3"/>
+          </a:effectRef>
+          <a:fontRef idx="minor">
+            <a:schemeClr val="dk1"/>
+          </a:fontRef>
+        </p:style>
+        <p:txBody>
+          <a:bodyPr wrap="square" lIns="45720" rIns="45720" rtlCol="0" anchor="ctr">
+            <a:noAutofit/>
+          </a:bodyPr>
+          <a:lstStyle/>
+          <a:p>
+            <a:pPr algn="ctr"/>
+            <a:r>
+              <a:rPr lang="en-US" dirty="0">
+                <a:latin typeface="Calibri" pitchFamily="34" charset="0"/>
+                <a:cs typeface="Calibri" pitchFamily="34" charset="0"/>
+              </a:rPr>
+              <a:t>We show you both how to install it and uninstall it</a:t>
+            </a:r>
+          </a:p>
+        </p:txBody>
+      </p:sp>
+    </p:spTree>
+    <p:extLst>
+      <p:ext uri="{BB962C8B-B14F-4D97-AF65-F5344CB8AC3E}">
+        <p14:creationId xmlns:p14="http://schemas.microsoft.com/office/powerpoint/2010/main" val="3835780871"/>
+      </p:ext>
+    </p:extLst>
+  </p:cSld>
+  <p:clrMapOvr>
+    <a:masterClrMapping/>
+  </p:clrMapOvr>
+  <p:timing>
+    <p:tnLst>
+      <p:par>
+        <p:cTn id="1" dur="indefinite" restart="never" nodeType="tmRoot">
+          <p:childTnLst>
+            <p:seq concurrent="1" nextAc="seek">
+              <p:cTn id="2" dur="indefinite" nodeType="mainSeq">
+                <p:childTnLst>
+                  <p:par>
+                    <p:cTn id="3" fill="hold">
+                      <p:stCondLst>
+                        <p:cond delay="indefinite"/>
+                      </p:stCondLst>
+                      <p:childTnLst>
+                        <p:par>
+                          <p:cTn id="4" fill="hold">
+                            <p:stCondLst>
+                              <p:cond delay="0"/>
+                            </p:stCondLst>
+                            <p:childTnLst>
+                              <p:par>
+                                <p:cTn id="5" presetID="1" presetClass="entr" presetSubtype="0" fill="hold" grpId="0" nodeType="clickEffect">
+                                  <p:stCondLst>
+                                    <p:cond delay="0"/>
+                                  </p:stCondLst>
+                                  <p:childTnLst>
+                                    <p:set>
+                                      <p:cBhvr>
+                                        <p:cTn id="6" dur="1" fill="hold">
+                                          <p:stCondLst>
+                                            <p:cond delay="0"/>
+                                          </p:stCondLst>
+                                        </p:cTn>
+                                        <p:tgtEl>
+                                          <p:spTgt spid="3"/>
+                                        </p:tgtEl>
+                                        <p:attrNameLst>
+                                          <p:attrName>style.visibility</p:attrName>
+                                        </p:attrNameLst>
+                                      </p:cBhvr>
+                                      <p:to>
+                                        <p:strVal val="visible"/>
+                                      </p:to>
+                                    </p:set>
+                                  </p:childTnLst>
+                                </p:cTn>
+                              </p:par>
+                            </p:childTnLst>
+                          </p:cTn>
+                        </p:par>
+                      </p:childTnLst>
+                    </p:cTn>
+                  </p:par>
+                  <p:par>
+                    <p:cTn id="7" fill="hold">
+                      <p:stCondLst>
+                        <p:cond delay="indefinite"/>
+                      </p:stCondLst>
+                      <p:childTnLst>
+                        <p:par>
+                          <p:cTn id="8" fill="hold">
+                            <p:stCondLst>
+                              <p:cond delay="0"/>
+                            </p:stCondLst>
+                            <p:childTnLst>
+                              <p:par>
+                                <p:cTn id="9" presetID="1" presetClass="entr" presetSubtype="0" fill="hold" grpId="0" nodeType="clickEffect">
+                                  <p:stCondLst>
+                                    <p:cond delay="0"/>
+                                  </p:stCondLst>
+                                  <p:childTnLst>
+                                    <p:set>
+                                      <p:cBhvr>
+                                        <p:cTn id="10" dur="1" fill="hold">
+                                          <p:stCondLst>
+                                            <p:cond delay="0"/>
+                                          </p:stCondLst>
+                                        </p:cTn>
+                                        <p:tgtEl>
+                                          <p:spTgt spid="4"/>
+                                        </p:tgtEl>
+                                        <p:attrNameLst>
+                                          <p:attrName>style.visibility</p:attrName>
+                                        </p:attrNameLst>
+                                      </p:cBhvr>
+                                      <p:to>
+                                        <p:strVal val="visible"/>
+                                      </p:to>
+                                    </p:set>
+                                  </p:childTnLst>
+                                </p:cTn>
+                              </p:par>
+                            </p:childTnLst>
+                          </p:cTn>
+                        </p:par>
+                      </p:childTnLst>
+                    </p:cTn>
+                  </p:par>
+                </p:childTnLst>
+              </p:cTn>
+              <p:prevCondLst>
+                <p:cond evt="onPrev" delay="0">
+                  <p:tgtEl>
+                    <p:sldTgt/>
+                  </p:tgtEl>
+                </p:cond>
+              </p:prevCondLst>
+              <p:nextCondLst>
+                <p:cond evt="onNext" delay="0">
+                  <p:tgtEl>
+                    <p:sldTgt/>
+                  </p:tgtEl>
+                </p:cond>
+              </p:nextCondLst>
+            </p:seq>
+          </p:childTnLst>
+        </p:cTn>
+      </p:par>
+    </p:tnLst>
+    <p:bldLst>
+      <p:bldP spid="3" grpId="0" animBg="1"/>
+      <p:bldP spid="4" grpId="0" animBg="1"/>
+    </p:bldLst>
+  </p:timing>
+</p:sld>
+</file>
+
+<file path=ppt/slides/slide18.xml><?xml version="1.0" encoding="utf-8"?>
+<p:sld xmlns:a="http://schemas.openxmlformats.org/drawingml/2006/main" xmlns:r="http://schemas.openxmlformats.org/officeDocument/2006/relationships" xmlns:p="http://schemas.openxmlformats.org/presentationml/2006/main">
+  <p:cSld>
+    <p:spTree>
+      <p:nvGrpSpPr>
+        <p:cNvPr id="1" name=""/>
+        <p:cNvGrpSpPr/>
+        <p:nvPr/>
+      </p:nvGrpSpPr>
+      <p:grpSpPr>
+        <a:xfrm>
+          <a:off x="0" y="0"/>
+          <a:ext cx="0" cy="0"/>
+          <a:chOff x="0" y="0"/>
+          <a:chExt cx="0" cy="0"/>
+        </a:xfrm>
+      </p:grpSpPr>
+      <p:sp>
+        <p:nvSpPr>
+          <p:cNvPr id="2" name="Title 1"/>
+          <p:cNvSpPr>
+            <a:spLocks noGrp="1"/>
+          </p:cNvSpPr>
+          <p:nvPr>
+            <p:ph type="title"/>
+          </p:nvPr>
+        </p:nvSpPr>
+        <p:spPr/>
+        <p:txBody>
+          <a:bodyPr/>
+          <a:lstStyle/>
+          <a:p>
+            <a:r>
+              <a:rPr lang="en-US" dirty="0" err="1" smtClean="0"/>
+              <a:t>Help</a:t>
+            </a:r>
+            <a:r>
+              <a:rPr lang="en-US" dirty="0" err="1" smtClean="0">
+                <a:sym typeface="Wingdings" panose="05000000000000000000" pitchFamily="2" charset="2"/>
+              </a:rPr>
+              <a:t>Install</a:t>
+            </a:r>
+            <a:r>
+              <a:rPr lang="en-US" dirty="0" smtClean="0">
+                <a:sym typeface="Wingdings" panose="05000000000000000000" pitchFamily="2" charset="2"/>
+              </a:rPr>
+              <a:t> New Software</a:t>
+            </a:r>
+            <a:endParaRPr lang="en-US" dirty="0"/>
+          </a:p>
+        </p:txBody>
+      </p:sp>
+      <p:pic>
+        <p:nvPicPr>
+          <p:cNvPr id="6" name="Picture 5"/>
+          <p:cNvPicPr>
+            <a:picLocks noChangeAspect="1"/>
+          </p:cNvPicPr>
+          <p:nvPr/>
+        </p:nvPicPr>
+        <p:blipFill>
+          <a:blip r:embed="rId2"/>
+          <a:stretch>
+            <a:fillRect/>
+          </a:stretch>
+        </p:blipFill>
+        <p:spPr>
+          <a:xfrm>
+            <a:off x="1905000" y="1295400"/>
+            <a:ext cx="8245226" cy="4724400"/>
+          </a:xfrm>
+          <a:prstGeom prst="rect">
+            <a:avLst/>
+          </a:prstGeom>
+        </p:spPr>
+      </p:pic>
+    </p:spTree>
+    <p:extLst>
+      <p:ext uri="{BB962C8B-B14F-4D97-AF65-F5344CB8AC3E}">
+        <p14:creationId xmlns:p14="http://schemas.microsoft.com/office/powerpoint/2010/main" val="1910567005"/>
+      </p:ext>
+    </p:extLst>
+  </p:cSld>
+  <p:clrMapOvr>
+    <a:masterClrMapping/>
+  </p:clrMapOvr>
+  <p:timing>
+    <p:tnLst>
+      <p:par>
+        <p:cTn id="1" dur="indefinite" restart="never" nodeType="tmRoot"/>
+      </p:par>
+    </p:tnLst>
+  </p:timing>
+</p:sld>
+</file>
+
+<file path=ppt/slides/slide19.xml><?xml version="1.0" encoding="utf-8"?>
+<p:sld xmlns:a="http://schemas.openxmlformats.org/drawingml/2006/main" xmlns:r="http://schemas.openxmlformats.org/officeDocument/2006/relationships" xmlns:p="http://schemas.openxmlformats.org/presentationml/2006/main">
+  <p:cSld>
+    <p:spTree>
+      <p:nvGrpSpPr>
+        <p:cNvPr id="1" name=""/>
+        <p:cNvGrpSpPr/>
+        <p:nvPr/>
+      </p:nvGrpSpPr>
+      <p:grpSpPr>
+        <a:xfrm>
+          <a:off x="0" y="0"/>
+          <a:ext cx="0" cy="0"/>
+          <a:chOff x="0" y="0"/>
+          <a:chExt cx="0" cy="0"/>
+        </a:xfrm>
+      </p:grpSpPr>
+      <p:pic>
+        <p:nvPicPr>
+          <p:cNvPr id="10" name="Picture 9"/>
+          <p:cNvPicPr>
+            <a:picLocks noChangeAspect="1"/>
+          </p:cNvPicPr>
+          <p:nvPr/>
+        </p:nvPicPr>
+        <p:blipFill>
+          <a:blip r:embed="rId2"/>
+          <a:stretch>
+            <a:fillRect/>
+          </a:stretch>
+        </p:blipFill>
+        <p:spPr>
+          <a:xfrm>
+            <a:off x="2216167" y="914401"/>
+            <a:ext cx="6997667" cy="5427035"/>
+          </a:xfrm>
+          <a:prstGeom prst="rect">
+            <a:avLst/>
+          </a:prstGeom>
+        </p:spPr>
+      </p:pic>
+      <p:sp>
+        <p:nvSpPr>
+          <p:cNvPr id="2" name="Title 1"/>
+          <p:cNvSpPr>
+            <a:spLocks noGrp="1"/>
+          </p:cNvSpPr>
+          <p:nvPr>
+            <p:ph type="title"/>
+          </p:nvPr>
+        </p:nvSpPr>
+        <p:spPr>
+          <a:xfrm>
+            <a:off x="1524000" y="274638"/>
+            <a:ext cx="8382000" cy="792162"/>
+          </a:xfrm>
+        </p:spPr>
+        <p:txBody>
+          <a:bodyPr>
+            <a:normAutofit fontScale="90000"/>
+          </a:bodyPr>
+          <a:lstStyle/>
+          <a:p>
+            <a:r>
+              <a:rPr lang="en-US" dirty="0" smtClean="0"/>
+              <a:t>Hermes Plug-in Site and Check Hermes:</a:t>
+            </a:r>
+            <a:endParaRPr lang="en-US" dirty="0"/>
+          </a:p>
+        </p:txBody>
+      </p:sp>
+      <p:sp>
+        <p:nvSpPr>
+          <p:cNvPr id="5" name="Rectangle 4"/>
+          <p:cNvSpPr/>
+          <p:nvPr/>
+        </p:nvSpPr>
+        <p:spPr>
+          <a:xfrm>
+            <a:off x="2895600" y="1932338"/>
+            <a:ext cx="2667000" cy="381000"/>
+          </a:xfrm>
+          <a:prstGeom prst="rect">
+            <a:avLst/>
+          </a:prstGeom>
+          <a:noFill/>
+          <a:ln w="28575">
+            <a:solidFill>
+              <a:srgbClr val="FF0000"/>
+            </a:solidFill>
+          </a:ln>
+        </p:spPr>
+        <p:style>
+          <a:lnRef idx="2">
+            <a:schemeClr val="accent2"/>
+          </a:lnRef>
+          <a:fillRef idx="1">
+            <a:schemeClr val="lt1"/>
+          </a:fillRef>
+          <a:effectRef idx="0">
+            <a:schemeClr val="accent2"/>
+          </a:effectRef>
+          <a:fontRef idx="minor">
+            <a:schemeClr val="dk1"/>
+          </a:fontRef>
+        </p:style>
+        <p:txBody>
+          <a:bodyPr lIns="45720" rIns="45720" rtlCol="0" anchor="ctr">
+            <a:spAutoFit/>
+          </a:bodyPr>
+          <a:lstStyle/>
+          <a:p>
+            <a:pPr algn="ctr"/>
+            <a:endParaRPr lang="en-US" dirty="0">
+              <a:latin typeface="Calibri" pitchFamily="34" charset="0"/>
+              <a:cs typeface="Calibri" pitchFamily="34" charset="0"/>
+            </a:endParaRPr>
+          </a:p>
+        </p:txBody>
+      </p:sp>
+      <p:sp>
+        <p:nvSpPr>
+          <p:cNvPr id="7" name="Rectangle 6"/>
+          <p:cNvSpPr/>
+          <p:nvPr/>
+        </p:nvSpPr>
+        <p:spPr>
+          <a:xfrm>
+            <a:off x="2392949" y="2735846"/>
+            <a:ext cx="1295400" cy="369332"/>
+          </a:xfrm>
+          <a:prstGeom prst="rect">
+            <a:avLst/>
+          </a:prstGeom>
+          <a:noFill/>
+          <a:ln w="28575">
+            <a:solidFill>
+              <a:srgbClr val="FF0000"/>
+            </a:solidFill>
+          </a:ln>
+        </p:spPr>
+        <p:style>
+          <a:lnRef idx="2">
+            <a:schemeClr val="accent2"/>
+          </a:lnRef>
+          <a:fillRef idx="1">
+            <a:schemeClr val="lt1"/>
+          </a:fillRef>
+          <a:effectRef idx="0">
+            <a:schemeClr val="accent2"/>
+          </a:effectRef>
+          <a:fontRef idx="minor">
+            <a:schemeClr val="dk1"/>
+          </a:fontRef>
+        </p:style>
+        <p:txBody>
+          <a:bodyPr wrap="square" lIns="45720" rIns="45720" rtlCol="0" anchor="ctr">
+            <a:spAutoFit/>
+          </a:bodyPr>
+          <a:lstStyle/>
+          <a:p>
+            <a:pPr algn="ctr"/>
+            <a:endParaRPr lang="en-US" dirty="0">
+              <a:latin typeface="Calibri" pitchFamily="34" charset="0"/>
+              <a:cs typeface="Calibri" pitchFamily="34" charset="0"/>
+            </a:endParaRPr>
+          </a:p>
+        </p:txBody>
+      </p:sp>
+      <p:sp>
+        <p:nvSpPr>
+          <p:cNvPr id="8" name="Rectangle 7"/>
+          <p:cNvSpPr/>
+          <p:nvPr/>
+        </p:nvSpPr>
+        <p:spPr>
+          <a:xfrm>
+            <a:off x="4118009" y="1181719"/>
+            <a:ext cx="5732813" cy="826200"/>
+          </a:xfrm>
+          <a:prstGeom prst="rect">
+            <a:avLst/>
+          </a:prstGeom>
+        </p:spPr>
+        <p:style>
+          <a:lnRef idx="1">
+            <a:schemeClr val="accent1"/>
+          </a:lnRef>
+          <a:fillRef idx="2">
+            <a:schemeClr val="accent1"/>
+          </a:fillRef>
+          <a:effectRef idx="1">
+            <a:schemeClr val="accent1"/>
+          </a:effectRef>
+          <a:fontRef idx="minor">
+            <a:schemeClr val="dk1"/>
+          </a:fontRef>
+        </p:style>
+        <p:txBody>
+          <a:bodyPr wrap="square" lIns="45720" rIns="45720" rtlCol="0" anchor="ctr">
+            <a:noAutofit/>
+          </a:bodyPr>
+          <a:lstStyle/>
+          <a:p>
+            <a:pPr algn="ctr"/>
+            <a:r>
+              <a:rPr lang="en-US" dirty="0">
+                <a:latin typeface="Calibri" pitchFamily="34" charset="0"/>
+                <a:cs typeface="Calibri" pitchFamily="34" charset="0"/>
+              </a:rPr>
+              <a:t>Enter: </a:t>
+            </a:r>
+            <a:r>
+              <a:rPr lang="en-US" dirty="0">
+                <a:hlinkClick r:id="rId3"/>
+              </a:rPr>
+              <a:t>http://www.cs.unc.edu/~dewan/plugins/hermes</a:t>
+            </a:r>
+            <a:r>
+              <a:rPr lang="en-US" dirty="0"/>
+              <a:t> in work</a:t>
+            </a:r>
+            <a:r>
+              <a:rPr lang="en-US" dirty="0">
+                <a:latin typeface="Calibri" pitchFamily="34" charset="0"/>
+                <a:cs typeface="Calibri" pitchFamily="34" charset="0"/>
+              </a:rPr>
+              <a:t> </a:t>
+            </a:r>
+            <a:r>
+              <a:rPr lang="en-US" dirty="0" smtClean="0">
+                <a:latin typeface="Calibri" pitchFamily="34" charset="0"/>
+                <a:cs typeface="Calibri" pitchFamily="34" charset="0"/>
+              </a:rPr>
+              <a:t>with and hit return</a:t>
+            </a:r>
+            <a:endParaRPr lang="en-US" dirty="0">
+              <a:latin typeface="Calibri" pitchFamily="34" charset="0"/>
+              <a:cs typeface="Calibri" pitchFamily="34" charset="0"/>
+            </a:endParaRPr>
+          </a:p>
+        </p:txBody>
+      </p:sp>
+      <p:sp>
+        <p:nvSpPr>
+          <p:cNvPr id="9" name="Rectangle 8"/>
+          <p:cNvSpPr/>
+          <p:nvPr/>
+        </p:nvSpPr>
+        <p:spPr>
+          <a:xfrm>
+            <a:off x="4380515" y="2650857"/>
+            <a:ext cx="3262882" cy="826200"/>
+          </a:xfrm>
+          <a:prstGeom prst="rect">
+            <a:avLst/>
+          </a:prstGeom>
+        </p:spPr>
+        <p:style>
+          <a:lnRef idx="1">
+            <a:schemeClr val="accent1"/>
+          </a:lnRef>
+          <a:fillRef idx="2">
+            <a:schemeClr val="accent1"/>
+          </a:fillRef>
+          <a:effectRef idx="1">
+            <a:schemeClr val="accent1"/>
+          </a:effectRef>
+          <a:fontRef idx="minor">
+            <a:schemeClr val="dk1"/>
+          </a:fontRef>
+        </p:style>
+        <p:txBody>
+          <a:bodyPr wrap="square" lIns="45720" rIns="45720" rtlCol="0" anchor="ctr">
+            <a:noAutofit/>
+          </a:bodyPr>
+          <a:lstStyle/>
+          <a:p>
+            <a:pPr algn="ctr"/>
+            <a:r>
+              <a:rPr lang="en-US" dirty="0">
+                <a:latin typeface="Calibri" pitchFamily="34" charset="0"/>
+                <a:cs typeface="Calibri" pitchFamily="34" charset="0"/>
+              </a:rPr>
+              <a:t>Check </a:t>
+            </a:r>
+            <a:r>
+              <a:rPr lang="en-US" dirty="0" err="1">
+                <a:latin typeface="Calibri" pitchFamily="34" charset="0"/>
+                <a:cs typeface="Calibri" pitchFamily="34" charset="0"/>
+              </a:rPr>
+              <a:t>HermesFeature</a:t>
+            </a:r>
+            <a:endParaRPr lang="en-US" dirty="0">
+              <a:latin typeface="Calibri" pitchFamily="34" charset="0"/>
+              <a:cs typeface="Calibri" pitchFamily="34" charset="0"/>
+            </a:endParaRPr>
+          </a:p>
+        </p:txBody>
+      </p:sp>
+      <p:sp>
+        <p:nvSpPr>
+          <p:cNvPr id="11" name="Rectangle 10"/>
+          <p:cNvSpPr/>
+          <p:nvPr/>
+        </p:nvSpPr>
+        <p:spPr>
+          <a:xfrm>
+            <a:off x="7162800" y="5709630"/>
+            <a:ext cx="1473786" cy="510802"/>
+          </a:xfrm>
+          <a:prstGeom prst="rect">
+            <a:avLst/>
+          </a:prstGeom>
+        </p:spPr>
+        <p:style>
+          <a:lnRef idx="1">
+            <a:schemeClr val="accent1"/>
+          </a:lnRef>
+          <a:fillRef idx="2">
+            <a:schemeClr val="accent1"/>
+          </a:fillRef>
+          <a:effectRef idx="1">
+            <a:schemeClr val="accent1"/>
+          </a:effectRef>
+          <a:fontRef idx="minor">
+            <a:schemeClr val="dk1"/>
+          </a:fontRef>
+        </p:style>
+        <p:txBody>
+          <a:bodyPr wrap="square" lIns="45720" rIns="45720" rtlCol="0" anchor="ctr">
+            <a:noAutofit/>
+          </a:bodyPr>
+          <a:lstStyle/>
+          <a:p>
+            <a:pPr algn="ctr"/>
+            <a:r>
+              <a:rPr lang="en-US" dirty="0">
+                <a:latin typeface="Calibri" pitchFamily="34" charset="0"/>
+                <a:cs typeface="Calibri" pitchFamily="34" charset="0"/>
+              </a:rPr>
+              <a:t>Next</a:t>
+            </a:r>
+          </a:p>
+        </p:txBody>
+      </p:sp>
+      <p:sp>
+        <p:nvSpPr>
+          <p:cNvPr id="12" name="Rectangle 11"/>
+          <p:cNvSpPr/>
+          <p:nvPr/>
+        </p:nvSpPr>
+        <p:spPr>
+          <a:xfrm>
+            <a:off x="5689014" y="5780365"/>
+            <a:ext cx="1295400" cy="369332"/>
+          </a:xfrm>
+          <a:prstGeom prst="rect">
+            <a:avLst/>
+          </a:prstGeom>
+          <a:noFill/>
+          <a:ln w="28575">
+            <a:solidFill>
+              <a:srgbClr val="FF0000"/>
+            </a:solidFill>
+          </a:ln>
+        </p:spPr>
+        <p:style>
+          <a:lnRef idx="2">
+            <a:schemeClr val="accent2"/>
+          </a:lnRef>
+          <a:fillRef idx="1">
+            <a:schemeClr val="lt1"/>
+          </a:fillRef>
+          <a:effectRef idx="0">
+            <a:schemeClr val="accent2"/>
+          </a:effectRef>
+          <a:fontRef idx="minor">
+            <a:schemeClr val="dk1"/>
+          </a:fontRef>
+        </p:style>
+        <p:txBody>
+          <a:bodyPr wrap="square" lIns="45720" rIns="45720" rtlCol="0" anchor="ctr">
+            <a:spAutoFit/>
+          </a:bodyPr>
+          <a:lstStyle/>
+          <a:p>
+            <a:pPr algn="ctr"/>
+            <a:endParaRPr lang="en-US" dirty="0">
+              <a:latin typeface="Calibri" pitchFamily="34" charset="0"/>
+              <a:cs typeface="Calibri" pitchFamily="34" charset="0"/>
+            </a:endParaRPr>
+          </a:p>
+        </p:txBody>
+      </p:sp>
+    </p:spTree>
+    <p:extLst>
+      <p:ext uri="{BB962C8B-B14F-4D97-AF65-F5344CB8AC3E}">
+        <p14:creationId xmlns:p14="http://schemas.microsoft.com/office/powerpoint/2010/main" val="3348869079"/>
+      </p:ext>
+    </p:extLst>
+  </p:cSld>
+  <p:clrMapOvr>
+    <a:masterClrMapping/>
+  </p:clrMapOvr>
+  <p:timing>
+    <p:tnLst>
+      <p:par>
+        <p:cTn id="1" dur="indefinite" restart="never" nodeType="tmRoot">
+          <p:childTnLst>
+            <p:seq concurrent="1" nextAc="seek">
+              <p:cTn id="2" dur="indefinite" nodeType="mainSeq">
+                <p:childTnLst>
+                  <p:par>
+                    <p:cTn id="3" fill="hold">
+                      <p:stCondLst>
+                        <p:cond delay="indefinite"/>
+                      </p:stCondLst>
+                      <p:childTnLst>
+                        <p:par>
+                          <p:cTn id="4" fill="hold">
+                            <p:stCondLst>
+                              <p:cond delay="0"/>
+                            </p:stCondLst>
+                            <p:childTnLst>
+                              <p:par>
+                                <p:cTn id="5" presetID="1" presetClass="entr" presetSubtype="0" fill="hold" grpId="0" nodeType="clickEffect">
+                                  <p:stCondLst>
+                                    <p:cond delay="0"/>
+                                  </p:stCondLst>
+                                  <p:childTnLst>
+                                    <p:set>
+                                      <p:cBhvr>
+                                        <p:cTn id="6" dur="1" fill="hold">
+                                          <p:stCondLst>
+                                            <p:cond delay="0"/>
+                                          </p:stCondLst>
+                                        </p:cTn>
+                                        <p:tgtEl>
+                                          <p:spTgt spid="8"/>
+                                        </p:tgtEl>
+                                        <p:attrNameLst>
+                                          <p:attrName>style.visibility</p:attrName>
+                                        </p:attrNameLst>
+                                      </p:cBhvr>
+                                      <p:to>
+                                        <p:strVal val="visible"/>
+                                      </p:to>
+                                    </p:set>
+                                  </p:childTnLst>
+                                </p:cTn>
+                              </p:par>
+                            </p:childTnLst>
+                          </p:cTn>
+                        </p:par>
+                      </p:childTnLst>
+                    </p:cTn>
+                  </p:par>
+                  <p:par>
+                    <p:cTn id="7" fill="hold">
+                      <p:stCondLst>
+                        <p:cond delay="indefinite"/>
+                      </p:stCondLst>
+                      <p:childTnLst>
+                        <p:par>
+                          <p:cTn id="8" fill="hold">
+                            <p:stCondLst>
+                              <p:cond delay="0"/>
+                            </p:stCondLst>
+                            <p:childTnLst>
+                              <p:par>
+                                <p:cTn id="9" presetID="1" presetClass="entr" presetSubtype="0" fill="hold" grpId="0" nodeType="clickEffect">
+                                  <p:stCondLst>
+                                    <p:cond delay="0"/>
+                                  </p:stCondLst>
+                                  <p:childTnLst>
+                                    <p:set>
+                                      <p:cBhvr>
+                                        <p:cTn id="10" dur="1" fill="hold">
+                                          <p:stCondLst>
+                                            <p:cond delay="0"/>
+                                          </p:stCondLst>
+                                        </p:cTn>
+                                        <p:tgtEl>
+                                          <p:spTgt spid="9"/>
+                                        </p:tgtEl>
+                                        <p:attrNameLst>
+                                          <p:attrName>style.visibility</p:attrName>
+                                        </p:attrNameLst>
+                                      </p:cBhvr>
+                                      <p:to>
+                                        <p:strVal val="visible"/>
+                                      </p:to>
+                                    </p:set>
+                                  </p:childTnLst>
+                                </p:cTn>
+                              </p:par>
+                            </p:childTnLst>
+                          </p:cTn>
+                        </p:par>
+                      </p:childTnLst>
+                    </p:cTn>
+                  </p:par>
+                  <p:par>
+                    <p:cTn id="11" fill="hold">
+                      <p:stCondLst>
+                        <p:cond delay="indefinite"/>
+                      </p:stCondLst>
+                      <p:childTnLst>
+                        <p:par>
+                          <p:cTn id="12" fill="hold">
+                            <p:stCondLst>
+                              <p:cond delay="0"/>
+                            </p:stCondLst>
+                            <p:childTnLst>
+                              <p:par>
+                                <p:cTn id="13" presetID="1" presetClass="entr" presetSubtype="0" fill="hold" grpId="0" nodeType="clickEffect">
+                                  <p:stCondLst>
+                                    <p:cond delay="0"/>
+                                  </p:stCondLst>
+                                  <p:childTnLst>
+                                    <p:set>
+                                      <p:cBhvr>
+                                        <p:cTn id="14" dur="1" fill="hold">
+                                          <p:stCondLst>
+                                            <p:cond delay="0"/>
+                                          </p:stCondLst>
+                                        </p:cTn>
+                                        <p:tgtEl>
+                                          <p:spTgt spid="11"/>
+                                        </p:tgtEl>
+                                        <p:attrNameLst>
+                                          <p:attrName>style.visibility</p:attrName>
+                                        </p:attrNameLst>
+                                      </p:cBhvr>
+                                      <p:to>
+                                        <p:strVal val="visible"/>
+                                      </p:to>
+                                    </p:set>
+                                  </p:childTnLst>
+                                </p:cTn>
+                              </p:par>
+                            </p:childTnLst>
+                          </p:cTn>
+                        </p:par>
+                      </p:childTnLst>
+                    </p:cTn>
+                  </p:par>
+                </p:childTnLst>
+              </p:cTn>
+              <p:prevCondLst>
+                <p:cond evt="onPrev" delay="0">
+                  <p:tgtEl>
+                    <p:sldTgt/>
+                  </p:tgtEl>
+                </p:cond>
+              </p:prevCondLst>
+              <p:nextCondLst>
+                <p:cond evt="onNext" delay="0">
+                  <p:tgtEl>
+                    <p:sldTgt/>
+                  </p:tgtEl>
+                </p:cond>
+              </p:nextCondLst>
+            </p:seq>
+          </p:childTnLst>
+        </p:cTn>
+      </p:par>
+    </p:tnLst>
+    <p:bldLst>
+      <p:bldP spid="8" grpId="0" animBg="1"/>
+      <p:bldP spid="9" grpId="0" animBg="1"/>
+      <p:bldP spid="11" grpId="0" animBg="1"/>
+    </p:bldLst>
+  </p:timing>
+</p:sld>
+</file>
+
+<file path=ppt/slides/slide2.xml><?xml version="1.0" encoding="utf-8"?>
+<p:sld xmlns:a="http://schemas.openxmlformats.org/drawingml/2006/main" xmlns:r="http://schemas.openxmlformats.org/officeDocument/2006/relationships" xmlns:p="http://schemas.openxmlformats.org/presentationml/2006/main">
+  <p:cSld>
+    <p:spTree>
+      <p:nvGrpSpPr>
+        <p:cNvPr id="1" name=""/>
+        <p:cNvGrpSpPr/>
+        <p:nvPr/>
+      </p:nvGrpSpPr>
+      <p:grpSpPr>
+        <a:xfrm>
+          <a:off x="0" y="0"/>
+          <a:ext cx="0" cy="0"/>
+          <a:chOff x="0" y="0"/>
+          <a:chExt cx="0" cy="0"/>
+        </a:xfrm>
+      </p:grpSpPr>
+      <p:sp>
+        <p:nvSpPr>
+          <p:cNvPr id="2" name="Title 1"/>
+          <p:cNvSpPr>
+            <a:spLocks noGrp="1"/>
+          </p:cNvSpPr>
+          <p:nvPr>
+            <p:ph type="title"/>
+          </p:nvPr>
+        </p:nvSpPr>
+        <p:spPr/>
+        <p:txBody>
+          <a:bodyPr/>
+          <a:lstStyle/>
+          <a:p>
+            <a:r>
+              <a:rPr lang="en-US" dirty="0" smtClean="0"/>
+              <a:t>Table of Contents</a:t>
+            </a:r>
+            <a:endParaRPr lang="en-US" dirty="0"/>
+          </a:p>
+        </p:txBody>
+      </p:sp>
+      <p:sp>
+        <p:nvSpPr>
+          <p:cNvPr id="3" name="Content Placeholder 2"/>
+          <p:cNvSpPr>
+            <a:spLocks noGrp="1"/>
+          </p:cNvSpPr>
+          <p:nvPr>
+            <p:ph idx="1"/>
+          </p:nvPr>
+        </p:nvSpPr>
+        <p:spPr/>
+        <p:txBody>
+          <a:bodyPr/>
+          <a:lstStyle/>
+          <a:p>
+            <a:r>
+              <a:rPr lang="en-US" dirty="0" smtClean="0">
+                <a:hlinkClick r:id="rId2" action="ppaction://hlinksldjump"/>
+              </a:rPr>
+              <a:t>Setting up the C++ development environment</a:t>
+            </a:r>
+            <a:endParaRPr lang="en-US" dirty="0" smtClean="0"/>
+          </a:p>
+          <a:p>
+            <a:r>
+              <a:rPr lang="en-US" dirty="0" smtClean="0">
+                <a:hlinkClick r:id="rId3" action="ppaction://hlinksldjump"/>
+              </a:rPr>
+              <a:t>Setting Up the Eclipse C++ Environment</a:t>
+            </a:r>
+            <a:endParaRPr lang="en-US" dirty="0" smtClean="0"/>
+          </a:p>
+          <a:p>
+            <a:r>
+              <a:rPr lang="en-US" dirty="0" smtClean="0">
+                <a:hlinkClick r:id="rId4" action="ppaction://hlinksldjump"/>
+              </a:rPr>
+              <a:t>Installing Logging Plug-in</a:t>
+            </a:r>
+            <a:endParaRPr lang="en-US" dirty="0" smtClean="0"/>
+          </a:p>
+          <a:p>
+            <a:r>
+              <a:rPr lang="en-US" dirty="0" smtClean="0">
+                <a:hlinkClick r:id="rId5" action="ppaction://hlinksldjump"/>
+              </a:rPr>
+              <a:t>Importing the Training </a:t>
+            </a:r>
+            <a:r>
+              <a:rPr lang="en-US" dirty="0" err="1" smtClean="0">
+                <a:hlinkClick r:id="rId5" action="ppaction://hlinksldjump"/>
+              </a:rPr>
+              <a:t>Git</a:t>
+            </a:r>
+            <a:r>
+              <a:rPr lang="en-US" dirty="0" smtClean="0">
+                <a:hlinkClick r:id="rId5" action="ppaction://hlinksldjump"/>
+              </a:rPr>
+              <a:t> Project</a:t>
+            </a:r>
+            <a:endParaRPr lang="en-US" dirty="0" smtClean="0"/>
+          </a:p>
+          <a:p>
+            <a:r>
+              <a:rPr lang="en-US" dirty="0" smtClean="0">
+                <a:hlinkClick r:id="rId6" action="ppaction://hlinksldjump"/>
+              </a:rPr>
+              <a:t>Building Project (Once)</a:t>
+            </a:r>
+            <a:endParaRPr lang="en-US" dirty="0" smtClean="0"/>
+          </a:p>
+          <a:p>
+            <a:r>
+              <a:rPr lang="en-US" dirty="0" smtClean="0">
+                <a:hlinkClick r:id="rId7" action="ppaction://hlinksldjump"/>
+              </a:rPr>
+              <a:t>Editing and Running Project</a:t>
+            </a:r>
+            <a:endParaRPr lang="en-US" dirty="0" smtClean="0"/>
+          </a:p>
+          <a:p>
+            <a:r>
+              <a:rPr lang="en-US" dirty="0" smtClean="0">
+                <a:hlinkClick r:id="rId8" action="ppaction://hlinksldjump"/>
+              </a:rPr>
+              <a:t>Recording Difficulties</a:t>
+            </a:r>
+            <a:endParaRPr lang="en-US" dirty="0" smtClean="0"/>
+          </a:p>
+          <a:p>
+            <a:r>
+              <a:rPr lang="en-US" dirty="0" smtClean="0">
+                <a:hlinkClick r:id="rId9" action="ppaction://hlinksldjump"/>
+              </a:rPr>
+              <a:t>Uninstalling Logging Plugin</a:t>
+            </a:r>
+            <a:endParaRPr lang="en-US" dirty="0"/>
+          </a:p>
+          <a:p>
+            <a:endParaRPr lang="en-US" dirty="0" smtClean="0"/>
+          </a:p>
+          <a:p>
+            <a:endParaRPr lang="en-US" dirty="0"/>
+          </a:p>
+        </p:txBody>
+      </p:sp>
+    </p:spTree>
+    <p:extLst>
+      <p:ext uri="{BB962C8B-B14F-4D97-AF65-F5344CB8AC3E}">
+        <p14:creationId xmlns:p14="http://schemas.microsoft.com/office/powerpoint/2010/main" val="577391825"/>
+      </p:ext>
+    </p:extLst>
+  </p:cSld>
+  <p:clrMapOvr>
+    <a:masterClrMapping/>
+  </p:clrMapOvr>
+</p:sld>
+</file>
+
+<file path=ppt/slides/slide20.xml><?xml version="1.0" encoding="utf-8"?>
+<p:sld xmlns:a="http://schemas.openxmlformats.org/drawingml/2006/main" xmlns:r="http://schemas.openxmlformats.org/officeDocument/2006/relationships" xmlns:p="http://schemas.openxmlformats.org/presentationml/2006/main">
+  <p:cSld>
+    <p:spTree>
+      <p:nvGrpSpPr>
+        <p:cNvPr id="1" name=""/>
+        <p:cNvGrpSpPr/>
+        <p:nvPr/>
+      </p:nvGrpSpPr>
+      <p:grpSpPr>
+        <a:xfrm>
+          <a:off x="0" y="0"/>
+          <a:ext cx="0" cy="0"/>
+          <a:chOff x="0" y="0"/>
+          <a:chExt cx="0" cy="0"/>
+        </a:xfrm>
+      </p:grpSpPr>
+      <p:sp>
+        <p:nvSpPr>
+          <p:cNvPr id="2" name="Title 1"/>
+          <p:cNvSpPr>
+            <a:spLocks noGrp="1"/>
+          </p:cNvSpPr>
+          <p:nvPr>
+            <p:ph type="title"/>
+          </p:nvPr>
+        </p:nvSpPr>
+        <p:spPr>
+          <a:xfrm>
+            <a:off x="1524000" y="274638"/>
+            <a:ext cx="8382000" cy="792162"/>
+          </a:xfrm>
+        </p:spPr>
+        <p:txBody>
+          <a:bodyPr>
+            <a:normAutofit/>
+          </a:bodyPr>
+          <a:lstStyle/>
+          <a:p>
+            <a:r>
+              <a:rPr lang="en-US" dirty="0" smtClean="0"/>
+              <a:t>Confirm</a:t>
+            </a:r>
+            <a:endParaRPr lang="en-US" dirty="0"/>
+          </a:p>
+        </p:txBody>
+      </p:sp>
+      <p:pic>
+        <p:nvPicPr>
+          <p:cNvPr id="3" name="Picture 2"/>
+          <p:cNvPicPr>
+            <a:picLocks noChangeAspect="1"/>
+          </p:cNvPicPr>
+          <p:nvPr/>
+        </p:nvPicPr>
+        <p:blipFill>
+          <a:blip r:embed="rId2"/>
+          <a:stretch>
+            <a:fillRect/>
+          </a:stretch>
+        </p:blipFill>
+        <p:spPr>
+          <a:xfrm>
+            <a:off x="2556641" y="1068141"/>
+            <a:ext cx="6887942" cy="5341938"/>
+          </a:xfrm>
+          <a:prstGeom prst="rect">
+            <a:avLst/>
+          </a:prstGeom>
+        </p:spPr>
+      </p:pic>
+      <p:sp>
+        <p:nvSpPr>
+          <p:cNvPr id="13" name="Rectangle 12"/>
+          <p:cNvSpPr/>
+          <p:nvPr/>
+        </p:nvSpPr>
+        <p:spPr>
+          <a:xfrm>
+            <a:off x="5990102" y="5932765"/>
+            <a:ext cx="1295400" cy="369332"/>
+          </a:xfrm>
+          <a:prstGeom prst="rect">
+            <a:avLst/>
+          </a:prstGeom>
+          <a:noFill/>
+          <a:ln w="28575">
+            <a:solidFill>
+              <a:srgbClr val="FF0000"/>
+            </a:solidFill>
+          </a:ln>
+        </p:spPr>
+        <p:style>
+          <a:lnRef idx="2">
+            <a:schemeClr val="accent2"/>
+          </a:lnRef>
+          <a:fillRef idx="1">
+            <a:schemeClr val="lt1"/>
+          </a:fillRef>
+          <a:effectRef idx="0">
+            <a:schemeClr val="accent2"/>
+          </a:effectRef>
+          <a:fontRef idx="minor">
+            <a:schemeClr val="dk1"/>
+          </a:fontRef>
+        </p:style>
+        <p:txBody>
+          <a:bodyPr wrap="square" lIns="45720" rIns="45720" rtlCol="0" anchor="ctr">
+            <a:spAutoFit/>
+          </a:bodyPr>
+          <a:lstStyle/>
+          <a:p>
+            <a:pPr algn="ctr"/>
+            <a:endParaRPr lang="en-US" dirty="0">
+              <a:latin typeface="Calibri" pitchFamily="34" charset="0"/>
+              <a:cs typeface="Calibri" pitchFamily="34" charset="0"/>
+            </a:endParaRPr>
+          </a:p>
+        </p:txBody>
+      </p:sp>
+      <p:sp>
+        <p:nvSpPr>
+          <p:cNvPr id="14" name="Rectangle 13"/>
+          <p:cNvSpPr/>
+          <p:nvPr/>
+        </p:nvSpPr>
+        <p:spPr>
+          <a:xfrm>
+            <a:off x="4380515" y="2650857"/>
+            <a:ext cx="3262882" cy="826200"/>
+          </a:xfrm>
+          <a:prstGeom prst="rect">
+            <a:avLst/>
+          </a:prstGeom>
+        </p:spPr>
+        <p:style>
+          <a:lnRef idx="1">
+            <a:schemeClr val="accent1"/>
+          </a:lnRef>
+          <a:fillRef idx="2">
+            <a:schemeClr val="accent1"/>
+          </a:fillRef>
+          <a:effectRef idx="1">
+            <a:schemeClr val="accent1"/>
+          </a:effectRef>
+          <a:fontRef idx="minor">
+            <a:schemeClr val="dk1"/>
+          </a:fontRef>
+        </p:style>
+        <p:txBody>
+          <a:bodyPr wrap="square" lIns="45720" rIns="45720" rtlCol="0" anchor="ctr">
+            <a:noAutofit/>
+          </a:bodyPr>
+          <a:lstStyle/>
+          <a:p>
+            <a:pPr algn="ctr"/>
+            <a:r>
+              <a:rPr lang="en-US" dirty="0">
+                <a:latin typeface="Calibri" pitchFamily="34" charset="0"/>
+                <a:cs typeface="Calibri" pitchFamily="34" charset="0"/>
+              </a:rPr>
+              <a:t>Check </a:t>
+            </a:r>
+            <a:r>
+              <a:rPr lang="en-US" dirty="0" err="1">
+                <a:latin typeface="Calibri" pitchFamily="34" charset="0"/>
+                <a:cs typeface="Calibri" pitchFamily="34" charset="0"/>
+              </a:rPr>
+              <a:t>HermesFeature</a:t>
+            </a:r>
+            <a:endParaRPr lang="en-US" dirty="0">
+              <a:latin typeface="Calibri" pitchFamily="34" charset="0"/>
+              <a:cs typeface="Calibri" pitchFamily="34" charset="0"/>
+            </a:endParaRPr>
+          </a:p>
+        </p:txBody>
+      </p:sp>
+    </p:spTree>
+    <p:extLst>
+      <p:ext uri="{BB962C8B-B14F-4D97-AF65-F5344CB8AC3E}">
+        <p14:creationId xmlns:p14="http://schemas.microsoft.com/office/powerpoint/2010/main" val="322469297"/>
+      </p:ext>
+    </p:extLst>
+  </p:cSld>
+  <p:clrMapOvr>
+    <a:masterClrMapping/>
+  </p:clrMapOvr>
+  <p:timing>
+    <p:tnLst>
+      <p:par>
+        <p:cTn id="1" dur="indefinite" restart="never" nodeType="tmRoot">
+          <p:childTnLst>
+            <p:seq concurrent="1" nextAc="seek">
+              <p:cTn id="2" dur="indefinite" nodeType="mainSeq">
+                <p:childTnLst>
+                  <p:par>
+                    <p:cTn id="3" fill="hold">
+                      <p:stCondLst>
+                        <p:cond delay="indefinite"/>
+                      </p:stCondLst>
+                      <p:childTnLst>
+                        <p:par>
+                          <p:cTn id="4" fill="hold">
+                            <p:stCondLst>
+                              <p:cond delay="0"/>
+                            </p:stCondLst>
+                            <p:childTnLst>
+                              <p:par>
+                                <p:cTn id="5" presetID="1" presetClass="entr" presetSubtype="0" fill="hold" grpId="0" nodeType="clickEffect">
+                                  <p:stCondLst>
+                                    <p:cond delay="0"/>
+                                  </p:stCondLst>
+                                  <p:childTnLst>
+                                    <p:set>
+                                      <p:cBhvr>
+                                        <p:cTn id="6" dur="1" fill="hold">
+                                          <p:stCondLst>
+                                            <p:cond delay="0"/>
+                                          </p:stCondLst>
+                                        </p:cTn>
+                                        <p:tgtEl>
+                                          <p:spTgt spid="14"/>
+                                        </p:tgtEl>
+                                        <p:attrNameLst>
+                                          <p:attrName>style.visibility</p:attrName>
+                                        </p:attrNameLst>
+                                      </p:cBhvr>
+                                      <p:to>
+                                        <p:strVal val="visible"/>
+                                      </p:to>
+                                    </p:set>
+                                  </p:childTnLst>
+                                </p:cTn>
+                              </p:par>
+                            </p:childTnLst>
+                          </p:cTn>
+                        </p:par>
+                      </p:childTnLst>
+                    </p:cTn>
+                  </p:par>
+                </p:childTnLst>
+              </p:cTn>
+              <p:prevCondLst>
+                <p:cond evt="onPrev" delay="0">
+                  <p:tgtEl>
+                    <p:sldTgt/>
+                  </p:tgtEl>
+                </p:cond>
+              </p:prevCondLst>
+              <p:nextCondLst>
+                <p:cond evt="onNext" delay="0">
+                  <p:tgtEl>
+                    <p:sldTgt/>
+                  </p:tgtEl>
+                </p:cond>
+              </p:nextCondLst>
+            </p:seq>
+          </p:childTnLst>
+        </p:cTn>
+      </p:par>
+    </p:tnLst>
+    <p:bldLst>
+      <p:bldP spid="14" grpId="0" animBg="1"/>
+    </p:bldLst>
+  </p:timing>
+</p:sld>
+</file>
+
+<file path=ppt/slides/slide21.xml><?xml version="1.0" encoding="utf-8"?>
+<p:sld xmlns:a="http://schemas.openxmlformats.org/drawingml/2006/main" xmlns:r="http://schemas.openxmlformats.org/officeDocument/2006/relationships" xmlns:p="http://schemas.openxmlformats.org/presentationml/2006/main">
+  <p:cSld>
+    <p:spTree>
+      <p:nvGrpSpPr>
+        <p:cNvPr id="1" name=""/>
+        <p:cNvGrpSpPr/>
+        <p:nvPr/>
+      </p:nvGrpSpPr>
+      <p:grpSpPr>
+        <a:xfrm>
+          <a:off x="0" y="0"/>
+          <a:ext cx="0" cy="0"/>
+          <a:chOff x="0" y="0"/>
+          <a:chExt cx="0" cy="0"/>
+        </a:xfrm>
+      </p:grpSpPr>
+      <p:pic>
+        <p:nvPicPr>
+          <p:cNvPr id="4" name="Picture 3"/>
+          <p:cNvPicPr>
+            <a:picLocks noChangeAspect="1"/>
+          </p:cNvPicPr>
+          <p:nvPr/>
+        </p:nvPicPr>
+        <p:blipFill>
+          <a:blip r:embed="rId2"/>
+          <a:stretch>
+            <a:fillRect/>
+          </a:stretch>
+        </p:blipFill>
+        <p:spPr>
+          <a:xfrm>
+            <a:off x="2349625" y="1103586"/>
+            <a:ext cx="7280954" cy="5646738"/>
+          </a:xfrm>
+          <a:prstGeom prst="rect">
+            <a:avLst/>
+          </a:prstGeom>
+        </p:spPr>
+      </p:pic>
+      <p:sp>
+        <p:nvSpPr>
+          <p:cNvPr id="2" name="Title 1"/>
+          <p:cNvSpPr>
+            <a:spLocks noGrp="1"/>
+          </p:cNvSpPr>
+          <p:nvPr>
+            <p:ph type="title"/>
+          </p:nvPr>
+        </p:nvSpPr>
+        <p:spPr>
+          <a:xfrm>
+            <a:off x="1524000" y="274638"/>
+            <a:ext cx="8382000" cy="792162"/>
+          </a:xfrm>
+        </p:spPr>
+        <p:txBody>
+          <a:bodyPr>
+            <a:normAutofit/>
+          </a:bodyPr>
+          <a:lstStyle/>
+          <a:p>
+            <a:r>
+              <a:rPr lang="en-US" dirty="0" smtClean="0"/>
+              <a:t>Accept License</a:t>
+            </a:r>
+            <a:endParaRPr lang="en-US" dirty="0"/>
+          </a:p>
+        </p:txBody>
+      </p:sp>
+      <p:sp>
+        <p:nvSpPr>
+          <p:cNvPr id="13" name="Rectangle 12"/>
+          <p:cNvSpPr/>
+          <p:nvPr/>
+        </p:nvSpPr>
+        <p:spPr>
+          <a:xfrm>
+            <a:off x="2349625" y="5094565"/>
+            <a:ext cx="1295400" cy="369332"/>
+          </a:xfrm>
+          <a:prstGeom prst="rect">
+            <a:avLst/>
+          </a:prstGeom>
+          <a:noFill/>
+          <a:ln w="28575">
+            <a:solidFill>
+              <a:srgbClr val="FF0000"/>
+            </a:solidFill>
+          </a:ln>
+        </p:spPr>
+        <p:style>
+          <a:lnRef idx="2">
+            <a:schemeClr val="accent2"/>
+          </a:lnRef>
+          <a:fillRef idx="1">
+            <a:schemeClr val="lt1"/>
+          </a:fillRef>
+          <a:effectRef idx="0">
+            <a:schemeClr val="accent2"/>
+          </a:effectRef>
+          <a:fontRef idx="minor">
+            <a:schemeClr val="dk1"/>
+          </a:fontRef>
+        </p:style>
+        <p:txBody>
+          <a:bodyPr wrap="square" lIns="45720" rIns="45720" rtlCol="0" anchor="ctr">
+            <a:spAutoFit/>
+          </a:bodyPr>
+          <a:lstStyle/>
+          <a:p>
+            <a:pPr algn="ctr"/>
+            <a:endParaRPr lang="en-US" dirty="0">
+              <a:latin typeface="Calibri" pitchFamily="34" charset="0"/>
+              <a:cs typeface="Calibri" pitchFamily="34" charset="0"/>
+            </a:endParaRPr>
+          </a:p>
+        </p:txBody>
+      </p:sp>
+      <p:sp>
+        <p:nvSpPr>
+          <p:cNvPr id="6" name="Rectangle 5"/>
+          <p:cNvSpPr/>
+          <p:nvPr/>
+        </p:nvSpPr>
+        <p:spPr>
+          <a:xfrm>
+            <a:off x="3124200" y="3079734"/>
+            <a:ext cx="4495800" cy="826200"/>
+          </a:xfrm>
+          <a:prstGeom prst="rect">
+            <a:avLst/>
+          </a:prstGeom>
+        </p:spPr>
+        <p:style>
+          <a:lnRef idx="1">
+            <a:schemeClr val="accent1"/>
+          </a:lnRef>
+          <a:fillRef idx="2">
+            <a:schemeClr val="accent1"/>
+          </a:fillRef>
+          <a:effectRef idx="1">
+            <a:schemeClr val="accent1"/>
+          </a:effectRef>
+          <a:fontRef idx="minor">
+            <a:schemeClr val="dk1"/>
+          </a:fontRef>
+        </p:style>
+        <p:txBody>
+          <a:bodyPr wrap="square" lIns="45720" rIns="45720" rtlCol="0" anchor="ctr">
+            <a:noAutofit/>
+          </a:bodyPr>
+          <a:lstStyle/>
+          <a:p>
+            <a:pPr algn="ctr"/>
+            <a:r>
+              <a:rPr lang="en-US" dirty="0">
+                <a:latin typeface="Calibri" pitchFamily="34" charset="0"/>
+                <a:cs typeface="Calibri" pitchFamily="34" charset="0"/>
+              </a:rPr>
+              <a:t>License is empty now, but may add text</a:t>
+            </a:r>
+          </a:p>
+        </p:txBody>
+      </p:sp>
+    </p:spTree>
+    <p:extLst>
+      <p:ext uri="{BB962C8B-B14F-4D97-AF65-F5344CB8AC3E}">
+        <p14:creationId xmlns:p14="http://schemas.microsoft.com/office/powerpoint/2010/main" val="1470782878"/>
+      </p:ext>
+    </p:extLst>
+  </p:cSld>
+  <p:clrMapOvr>
+    <a:masterClrMapping/>
+  </p:clrMapOvr>
+  <p:timing>
+    <p:tnLst>
+      <p:par>
+        <p:cTn id="1" dur="indefinite" restart="never" nodeType="tmRoot">
+          <p:childTnLst>
+            <p:seq concurrent="1" nextAc="seek">
+              <p:cTn id="2" dur="indefinite" nodeType="mainSeq">
+                <p:childTnLst>
+                  <p:par>
+                    <p:cTn id="3" fill="hold">
+                      <p:stCondLst>
+                        <p:cond delay="indefinite"/>
+                      </p:stCondLst>
+                      <p:childTnLst>
+                        <p:par>
+                          <p:cTn id="4" fill="hold">
+                            <p:stCondLst>
+                              <p:cond delay="0"/>
+                            </p:stCondLst>
+                            <p:childTnLst>
+                              <p:par>
+                                <p:cTn id="5" presetID="1" presetClass="entr" presetSubtype="0" fill="hold" grpId="0" nodeType="clickEffect">
+                                  <p:stCondLst>
+                                    <p:cond delay="0"/>
+                                  </p:stCondLst>
+                                  <p:childTnLst>
+                                    <p:set>
+                                      <p:cBhvr>
+                                        <p:cTn id="6" dur="1" fill="hold">
+                                          <p:stCondLst>
+                                            <p:cond delay="0"/>
+                                          </p:stCondLst>
+                                        </p:cTn>
+                                        <p:tgtEl>
+                                          <p:spTgt spid="6"/>
+                                        </p:tgtEl>
+                                        <p:attrNameLst>
+                                          <p:attrName>style.visibility</p:attrName>
+                                        </p:attrNameLst>
+                                      </p:cBhvr>
+                                      <p:to>
+                                        <p:strVal val="visible"/>
+                                      </p:to>
+                                    </p:set>
+                                  </p:childTnLst>
+                                </p:cTn>
+                              </p:par>
+                            </p:childTnLst>
+                          </p:cTn>
+                        </p:par>
+                      </p:childTnLst>
+                    </p:cTn>
+                  </p:par>
+                </p:childTnLst>
+              </p:cTn>
+              <p:prevCondLst>
+                <p:cond evt="onPrev" delay="0">
+                  <p:tgtEl>
+                    <p:sldTgt/>
+                  </p:tgtEl>
+                </p:cond>
+              </p:prevCondLst>
+              <p:nextCondLst>
+                <p:cond evt="onNext" delay="0">
+                  <p:tgtEl>
+                    <p:sldTgt/>
+                  </p:tgtEl>
+                </p:cond>
+              </p:nextCondLst>
+            </p:seq>
+          </p:childTnLst>
+        </p:cTn>
+      </p:par>
+    </p:tnLst>
+    <p:bldLst>
+      <p:bldP spid="6" grpId="0" animBg="1"/>
+    </p:bldLst>
+  </p:timing>
+</p:sld>
+</file>
+
+<file path=ppt/slides/slide22.xml><?xml version="1.0" encoding="utf-8"?>
+<p:sld xmlns:a="http://schemas.openxmlformats.org/drawingml/2006/main" xmlns:r="http://schemas.openxmlformats.org/officeDocument/2006/relationships" xmlns:p="http://schemas.openxmlformats.org/presentationml/2006/main">
+  <p:cSld>
+    <p:spTree>
+      <p:nvGrpSpPr>
+        <p:cNvPr id="1" name=""/>
+        <p:cNvGrpSpPr/>
+        <p:nvPr/>
+      </p:nvGrpSpPr>
+      <p:grpSpPr>
+        <a:xfrm>
+          <a:off x="0" y="0"/>
+          <a:ext cx="0" cy="0"/>
+          <a:chOff x="0" y="0"/>
+          <a:chExt cx="0" cy="0"/>
+        </a:xfrm>
+      </p:grpSpPr>
+      <p:pic>
+        <p:nvPicPr>
+          <p:cNvPr id="4" name="Picture 3"/>
+          <p:cNvPicPr>
+            <a:picLocks noChangeAspect="1"/>
+          </p:cNvPicPr>
+          <p:nvPr/>
+        </p:nvPicPr>
+        <p:blipFill>
+          <a:blip r:embed="rId2"/>
+          <a:stretch>
+            <a:fillRect/>
+          </a:stretch>
+        </p:blipFill>
+        <p:spPr>
+          <a:xfrm>
+            <a:off x="1647825" y="2286000"/>
+            <a:ext cx="8591550" cy="2305050"/>
+          </a:xfrm>
+          <a:prstGeom prst="rect">
+            <a:avLst/>
+          </a:prstGeom>
+        </p:spPr>
+      </p:pic>
+      <p:sp>
+        <p:nvSpPr>
+          <p:cNvPr id="2" name="Title 1"/>
+          <p:cNvSpPr>
+            <a:spLocks noGrp="1"/>
+          </p:cNvSpPr>
+          <p:nvPr>
+            <p:ph type="title"/>
+          </p:nvPr>
+        </p:nvSpPr>
+        <p:spPr/>
+        <p:txBody>
+          <a:bodyPr/>
+          <a:lstStyle/>
+          <a:p>
+            <a:r>
+              <a:rPr lang="en-US" dirty="0" smtClean="0"/>
+              <a:t>Trust Us</a:t>
+            </a:r>
+            <a:endParaRPr lang="en-US" dirty="0"/>
+          </a:p>
+        </p:txBody>
+      </p:sp>
+      <p:sp>
+        <p:nvSpPr>
+          <p:cNvPr id="7" name="Rectangle 6"/>
+          <p:cNvSpPr/>
+          <p:nvPr/>
+        </p:nvSpPr>
+        <p:spPr>
+          <a:xfrm>
+            <a:off x="5410200" y="3951565"/>
+            <a:ext cx="1295400" cy="369332"/>
+          </a:xfrm>
+          <a:prstGeom prst="rect">
+            <a:avLst/>
+          </a:prstGeom>
+          <a:noFill/>
+          <a:ln w="28575">
+            <a:solidFill>
+              <a:srgbClr val="FF0000"/>
+            </a:solidFill>
+          </a:ln>
+        </p:spPr>
+        <p:style>
+          <a:lnRef idx="2">
+            <a:schemeClr val="accent2"/>
+          </a:lnRef>
+          <a:fillRef idx="1">
+            <a:schemeClr val="lt1"/>
+          </a:fillRef>
+          <a:effectRef idx="0">
+            <a:schemeClr val="accent2"/>
+          </a:effectRef>
+          <a:fontRef idx="minor">
+            <a:schemeClr val="dk1"/>
+          </a:fontRef>
+        </p:style>
+        <p:txBody>
+          <a:bodyPr wrap="square" lIns="45720" rIns="45720" rtlCol="0" anchor="ctr">
+            <a:spAutoFit/>
+          </a:bodyPr>
+          <a:lstStyle/>
+          <a:p>
+            <a:pPr algn="ctr"/>
+            <a:endParaRPr lang="en-US" dirty="0">
+              <a:latin typeface="Calibri" pitchFamily="34" charset="0"/>
+              <a:cs typeface="Calibri" pitchFamily="34" charset="0"/>
+            </a:endParaRPr>
+          </a:p>
+        </p:txBody>
+      </p:sp>
+    </p:spTree>
+    <p:extLst>
+      <p:ext uri="{BB962C8B-B14F-4D97-AF65-F5344CB8AC3E}">
+        <p14:creationId xmlns:p14="http://schemas.microsoft.com/office/powerpoint/2010/main" val="2849661954"/>
+      </p:ext>
+    </p:extLst>
+  </p:cSld>
+  <p:clrMapOvr>
+    <a:masterClrMapping/>
+  </p:clrMapOvr>
+  <p:timing>
+    <p:tnLst>
+      <p:par>
+        <p:cTn id="1" dur="indefinite" restart="never" nodeType="tmRoot"/>
+      </p:par>
+    </p:tnLst>
+  </p:timing>
+</p:sld>
+</file>
+
+<file path=ppt/slides/slide23.xml><?xml version="1.0" encoding="utf-8"?>
+<p:sld xmlns:a="http://schemas.openxmlformats.org/drawingml/2006/main" xmlns:r="http://schemas.openxmlformats.org/officeDocument/2006/relationships" xmlns:p="http://schemas.openxmlformats.org/presentationml/2006/main">
+  <p:cSld>
+    <p:spTree>
+      <p:nvGrpSpPr>
+        <p:cNvPr id="1" name=""/>
+        <p:cNvGrpSpPr/>
+        <p:nvPr/>
+      </p:nvGrpSpPr>
+      <p:grpSpPr>
+        <a:xfrm>
+          <a:off x="0" y="0"/>
+          <a:ext cx="0" cy="0"/>
+          <a:chOff x="0" y="0"/>
+          <a:chExt cx="0" cy="0"/>
+        </a:xfrm>
+      </p:grpSpPr>
+      <p:sp>
+        <p:nvSpPr>
+          <p:cNvPr id="2" name="Title 1"/>
+          <p:cNvSpPr>
+            <a:spLocks noGrp="1"/>
+          </p:cNvSpPr>
+          <p:nvPr>
+            <p:ph type="title"/>
+          </p:nvPr>
+        </p:nvSpPr>
+        <p:spPr/>
+        <p:txBody>
+          <a:bodyPr/>
+          <a:lstStyle/>
+          <a:p>
+            <a:r>
+              <a:rPr lang="en-US" dirty="0" smtClean="0"/>
+              <a:t>Restart Eclipse</a:t>
+            </a:r>
+            <a:endParaRPr lang="en-US" dirty="0"/>
+          </a:p>
+        </p:txBody>
+      </p:sp>
+      <p:pic>
+        <p:nvPicPr>
+          <p:cNvPr id="3" name="Picture 2"/>
+          <p:cNvPicPr>
+            <a:picLocks noChangeAspect="1"/>
+          </p:cNvPicPr>
+          <p:nvPr/>
+        </p:nvPicPr>
+        <p:blipFill>
+          <a:blip r:embed="rId2"/>
+          <a:stretch>
+            <a:fillRect/>
+          </a:stretch>
+        </p:blipFill>
+        <p:spPr>
+          <a:xfrm>
+            <a:off x="2000250" y="2390775"/>
+            <a:ext cx="8191500" cy="2076450"/>
+          </a:xfrm>
+          <a:prstGeom prst="rect">
+            <a:avLst/>
+          </a:prstGeom>
+        </p:spPr>
+      </p:pic>
+    </p:spTree>
+    <p:extLst>
+      <p:ext uri="{BB962C8B-B14F-4D97-AF65-F5344CB8AC3E}">
+        <p14:creationId xmlns:p14="http://schemas.microsoft.com/office/powerpoint/2010/main" val="795958719"/>
+      </p:ext>
+    </p:extLst>
+  </p:cSld>
+  <p:clrMapOvr>
+    <a:masterClrMapping/>
+  </p:clrMapOvr>
+  <p:timing>
+    <p:tnLst>
+      <p:par>
+        <p:cTn id="1" dur="indefinite" restart="never" nodeType="tmRoot"/>
+      </p:par>
+    </p:tnLst>
+  </p:timing>
+</p:sld>
+</file>
+
+<file path=ppt/slides/slide24.xml><?xml version="1.0" encoding="utf-8"?>
+<p:sld xmlns:a="http://schemas.openxmlformats.org/drawingml/2006/main" xmlns:r="http://schemas.openxmlformats.org/officeDocument/2006/relationships" xmlns:p="http://schemas.openxmlformats.org/presentationml/2006/main">
+  <p:cSld>
+    <p:spTree>
+      <p:nvGrpSpPr>
+        <p:cNvPr id="1" name=""/>
+        <p:cNvGrpSpPr/>
+        <p:nvPr/>
+      </p:nvGrpSpPr>
+      <p:grpSpPr>
+        <a:xfrm>
+          <a:off x="0" y="0"/>
+          <a:ext cx="0" cy="0"/>
+          <a:chOff x="0" y="0"/>
+          <a:chExt cx="0" cy="0"/>
+        </a:xfrm>
+      </p:grpSpPr>
+      <p:sp>
+        <p:nvSpPr>
+          <p:cNvPr id="2" name="Title 1"/>
+          <p:cNvSpPr>
+            <a:spLocks noGrp="1"/>
+          </p:cNvSpPr>
+          <p:nvPr>
+            <p:ph type="title"/>
+          </p:nvPr>
+        </p:nvSpPr>
+        <p:spPr/>
+        <p:txBody>
+          <a:bodyPr/>
+          <a:lstStyle/>
+          <a:p>
+            <a:r>
+              <a:rPr lang="en-US" dirty="0" smtClean="0"/>
+              <a:t>Logs</a:t>
+            </a:r>
+            <a:endParaRPr lang="en-US" dirty="0"/>
+          </a:p>
+        </p:txBody>
+      </p:sp>
+      <p:pic>
+        <p:nvPicPr>
+          <p:cNvPr id="3" name="Picture 2"/>
+          <p:cNvPicPr>
+            <a:picLocks noChangeAspect="1"/>
+          </p:cNvPicPr>
+          <p:nvPr/>
+        </p:nvPicPr>
+        <p:blipFill>
+          <a:blip r:embed="rId2"/>
+          <a:stretch>
+            <a:fillRect/>
+          </a:stretch>
+        </p:blipFill>
+        <p:spPr>
+          <a:xfrm>
+            <a:off x="3697501" y="2649382"/>
+            <a:ext cx="4152957" cy="2804439"/>
+          </a:xfrm>
+          <a:prstGeom prst="rect">
+            <a:avLst/>
+          </a:prstGeom>
+        </p:spPr>
+      </p:pic>
+      <p:sp>
+        <p:nvSpPr>
+          <p:cNvPr id="4" name="Rectangle 3"/>
+          <p:cNvSpPr/>
+          <p:nvPr/>
+        </p:nvSpPr>
+        <p:spPr>
+          <a:xfrm>
+            <a:off x="3915936" y="5744877"/>
+            <a:ext cx="4057187" cy="826200"/>
+          </a:xfrm>
+          <a:prstGeom prst="rect">
+            <a:avLst/>
+          </a:prstGeom>
+        </p:spPr>
+        <p:style>
+          <a:lnRef idx="1">
+            <a:schemeClr val="accent1"/>
+          </a:lnRef>
+          <a:fillRef idx="2">
+            <a:schemeClr val="accent1"/>
+          </a:fillRef>
+          <a:effectRef idx="1">
+            <a:schemeClr val="accent1"/>
+          </a:effectRef>
+          <a:fontRef idx="minor">
+            <a:schemeClr val="dk1"/>
+          </a:fontRef>
+        </p:style>
+        <p:txBody>
+          <a:bodyPr wrap="square" lIns="45720" rIns="45720" rtlCol="0" anchor="ctr">
+            <a:noAutofit/>
+          </a:bodyPr>
+          <a:lstStyle/>
+          <a:p>
+            <a:pPr algn="ctr"/>
+            <a:r>
+              <a:rPr lang="en-US" dirty="0" smtClean="0">
+                <a:latin typeface="Calibri" pitchFamily="34" charset="0"/>
+                <a:cs typeface="Calibri" pitchFamily="34" charset="0"/>
+              </a:rPr>
+              <a:t>After some interaction, refreshing the project will show you the logs folder</a:t>
+            </a:r>
+            <a:endParaRPr lang="en-US" dirty="0">
+              <a:latin typeface="Calibri" pitchFamily="34" charset="0"/>
+              <a:cs typeface="Calibri" pitchFamily="34" charset="0"/>
+            </a:endParaRPr>
+          </a:p>
+        </p:txBody>
+      </p:sp>
+    </p:spTree>
+    <p:extLst>
+      <p:ext uri="{BB962C8B-B14F-4D97-AF65-F5344CB8AC3E}">
+        <p14:creationId xmlns:p14="http://schemas.microsoft.com/office/powerpoint/2010/main" val="269312154"/>
+      </p:ext>
+    </p:extLst>
+  </p:cSld>
+  <p:clrMapOvr>
+    <a:masterClrMapping/>
+  </p:clrMapOvr>
+  <p:timing>
+    <p:tnLst>
+      <p:par>
+        <p:cTn id="1" dur="indefinite" restart="never" nodeType="tmRoot">
+          <p:childTnLst>
+            <p:seq concurrent="1" nextAc="seek">
+              <p:cTn id="2" dur="indefinite" nodeType="mainSeq">
+                <p:childTnLst>
+                  <p:par>
+                    <p:cTn id="3" fill="hold">
+                      <p:stCondLst>
+                        <p:cond delay="indefinite"/>
+                      </p:stCondLst>
+                      <p:childTnLst>
+                        <p:par>
+                          <p:cTn id="4" fill="hold">
+                            <p:stCondLst>
+                              <p:cond delay="0"/>
+                            </p:stCondLst>
+                            <p:childTnLst>
+                              <p:par>
+                                <p:cTn id="5" presetID="1" presetClass="entr" presetSubtype="0" fill="hold" grpId="0" nodeType="clickEffect">
+                                  <p:stCondLst>
+                                    <p:cond delay="0"/>
+                                  </p:stCondLst>
+                                  <p:childTnLst>
+                                    <p:set>
+                                      <p:cBhvr>
+                                        <p:cTn id="6" dur="1" fill="hold">
+                                          <p:stCondLst>
+                                            <p:cond delay="0"/>
+                                          </p:stCondLst>
+                                        </p:cTn>
+                                        <p:tgtEl>
+                                          <p:spTgt spid="4"/>
+                                        </p:tgtEl>
+                                        <p:attrNameLst>
+                                          <p:attrName>style.visibility</p:attrName>
+                                        </p:attrNameLst>
+                                      </p:cBhvr>
+                                      <p:to>
+                                        <p:strVal val="visible"/>
+                                      </p:to>
+                                    </p:set>
+                                  </p:childTnLst>
+                                </p:cTn>
+                              </p:par>
+                            </p:childTnLst>
+                          </p:cTn>
+                        </p:par>
+                      </p:childTnLst>
+                    </p:cTn>
+                  </p:par>
+                </p:childTnLst>
+              </p:cTn>
+              <p:prevCondLst>
+                <p:cond evt="onPrev" delay="0">
+                  <p:tgtEl>
+                    <p:sldTgt/>
+                  </p:tgtEl>
+                </p:cond>
+              </p:prevCondLst>
+              <p:nextCondLst>
+                <p:cond evt="onNext" delay="0">
+                  <p:tgtEl>
+                    <p:sldTgt/>
+                  </p:tgtEl>
+                </p:cond>
+              </p:nextCondLst>
+            </p:seq>
+          </p:childTnLst>
+        </p:cTn>
+      </p:par>
+    </p:tnLst>
+    <p:bldLst>
+      <p:bldP spid="4" grpId="0" animBg="1"/>
+    </p:bldLst>
+  </p:timing>
+</p:sld>
+</file>
+
+<file path=ppt/slides/slide25.xml><?xml version="1.0" encoding="utf-8"?>
+<p:sld xmlns:a="http://schemas.openxmlformats.org/drawingml/2006/main" xmlns:r="http://schemas.openxmlformats.org/officeDocument/2006/relationships" xmlns:p="http://schemas.openxmlformats.org/presentationml/2006/main">
+  <p:cSld>
+    <p:spTree>
+      <p:nvGrpSpPr>
+        <p:cNvPr id="1" name=""/>
+        <p:cNvGrpSpPr/>
+        <p:nvPr/>
+      </p:nvGrpSpPr>
+      <p:grpSpPr>
+        <a:xfrm>
+          <a:off x="0" y="0"/>
+          <a:ext cx="0" cy="0"/>
+          <a:chOff x="0" y="0"/>
+          <a:chExt cx="0" cy="0"/>
+        </a:xfrm>
+      </p:grpSpPr>
+      <p:sp>
+        <p:nvSpPr>
+          <p:cNvPr id="2" name="Title 1"/>
+          <p:cNvSpPr>
+            <a:spLocks noGrp="1"/>
+          </p:cNvSpPr>
+          <p:nvPr>
+            <p:ph type="title"/>
+          </p:nvPr>
+        </p:nvSpPr>
+        <p:spPr/>
+        <p:txBody>
+          <a:bodyPr/>
+          <a:lstStyle/>
+          <a:p>
+            <a:r>
+              <a:rPr lang="en-US" dirty="0" smtClean="0"/>
               <a:t>Import </a:t>
             </a:r>
             <a:r>
@@ -4542,7 +6610,7 @@
 </p:sld>
 </file>
 
-<file path=ppt/slides/slide18.xml><?xml version="1.0" encoding="utf-8"?>
+<file path=ppt/slides/slide26.xml><?xml version="1.0" encoding="utf-8"?>
 <p:sld xmlns:a="http://schemas.openxmlformats.org/drawingml/2006/main" xmlns:r="http://schemas.openxmlformats.org/officeDocument/2006/relationships" xmlns:p="http://schemas.openxmlformats.org/presentationml/2006/main">
   <p:cSld>
     <p:spTree>
@@ -4631,7 +6699,7 @@
 </p:sld>
 </file>
 
-<file path=ppt/slides/slide19.xml><?xml version="1.0" encoding="utf-8"?>
+<file path=ppt/slides/slide27.xml><?xml version="1.0" encoding="utf-8"?>
 <p:sld xmlns:a="http://schemas.openxmlformats.org/drawingml/2006/main" xmlns:r="http://schemas.openxmlformats.org/officeDocument/2006/relationships" xmlns:p="http://schemas.openxmlformats.org/presentationml/2006/main">
   <p:cSld>
     <p:spTree>
@@ -4749,133 +6817,7 @@
 </p:sld>
 </file>
 
-<file path=ppt/slides/slide2.xml><?xml version="1.0" encoding="utf-8"?>
-<p:sld xmlns:a="http://schemas.openxmlformats.org/drawingml/2006/main" xmlns:r="http://schemas.openxmlformats.org/officeDocument/2006/relationships" xmlns:p="http://schemas.openxmlformats.org/presentationml/2006/main">
-  <p:cSld>
-    <p:spTree>
-      <p:nvGrpSpPr>
-        <p:cNvPr id="1" name=""/>
-        <p:cNvGrpSpPr/>
-        <p:nvPr/>
-      </p:nvGrpSpPr>
-      <p:grpSpPr>
-        <a:xfrm>
-          <a:off x="0" y="0"/>
-          <a:ext cx="0" cy="0"/>
-          <a:chOff x="0" y="0"/>
-          <a:chExt cx="0" cy="0"/>
-        </a:xfrm>
-      </p:grpSpPr>
-      <p:sp>
-        <p:nvSpPr>
-          <p:cNvPr id="2" name="Title 1"/>
-          <p:cNvSpPr>
-            <a:spLocks noGrp="1"/>
-          </p:cNvSpPr>
-          <p:nvPr>
-            <p:ph type="title"/>
-          </p:nvPr>
-        </p:nvSpPr>
-        <p:spPr/>
-        <p:txBody>
-          <a:bodyPr/>
-          <a:lstStyle/>
-          <a:p>
-            <a:r>
-              <a:rPr lang="en-US" dirty="0" smtClean="0"/>
-              <a:t>Table of Contents</a:t>
-            </a:r>
-            <a:endParaRPr lang="en-US" dirty="0"/>
-          </a:p>
-        </p:txBody>
-      </p:sp>
-      <p:sp>
-        <p:nvSpPr>
-          <p:cNvPr id="3" name="Content Placeholder 2"/>
-          <p:cNvSpPr>
-            <a:spLocks noGrp="1"/>
-          </p:cNvSpPr>
-          <p:nvPr>
-            <p:ph idx="1"/>
-          </p:nvPr>
-        </p:nvSpPr>
-        <p:spPr/>
-        <p:txBody>
-          <a:bodyPr/>
-          <a:lstStyle/>
-          <a:p>
-            <a:r>
-              <a:rPr lang="en-US" dirty="0" smtClean="0">
-                <a:hlinkClick r:id="rId2" action="ppaction://hlinksldjump"/>
-              </a:rPr>
-              <a:t>Setting up the C++ development environment</a:t>
-            </a:r>
-            <a:endParaRPr lang="en-US" dirty="0" smtClean="0"/>
-          </a:p>
-          <a:p>
-            <a:r>
-              <a:rPr lang="en-US" dirty="0" smtClean="0">
-                <a:hlinkClick r:id="rId3" action="ppaction://hlinksldjump"/>
-              </a:rPr>
-              <a:t>Setting Up the Eclipse C++ Environment</a:t>
-            </a:r>
-            <a:endParaRPr lang="en-US" dirty="0" smtClean="0"/>
-          </a:p>
-          <a:p>
-            <a:r>
-              <a:rPr lang="en-US" dirty="0" smtClean="0">
-                <a:hlinkClick r:id="rId4" action="ppaction://hlinksldjump"/>
-              </a:rPr>
-              <a:t>Importing the Training </a:t>
-            </a:r>
-            <a:r>
-              <a:rPr lang="en-US" dirty="0" err="1" smtClean="0">
-                <a:hlinkClick r:id="rId4" action="ppaction://hlinksldjump"/>
-              </a:rPr>
-              <a:t>Git</a:t>
-            </a:r>
-            <a:r>
-              <a:rPr lang="en-US" dirty="0" smtClean="0">
-                <a:hlinkClick r:id="rId4" action="ppaction://hlinksldjump"/>
-              </a:rPr>
-              <a:t> Project</a:t>
-            </a:r>
-            <a:endParaRPr lang="en-US" dirty="0" smtClean="0"/>
-          </a:p>
-          <a:p>
-            <a:r>
-              <a:rPr lang="en-US" dirty="0" smtClean="0">
-                <a:hlinkClick r:id="rId5" action="ppaction://hlinksldjump"/>
-              </a:rPr>
-              <a:t>Building Project (Once)</a:t>
-            </a:r>
-            <a:endParaRPr lang="en-US" dirty="0" smtClean="0"/>
-          </a:p>
-          <a:p>
-            <a:r>
-              <a:rPr lang="en-US" dirty="0" smtClean="0">
-                <a:hlinkClick r:id="rId6" action="ppaction://hlinksldjump"/>
-              </a:rPr>
-              <a:t>Editing and Running Project</a:t>
-            </a:r>
-            <a:endParaRPr lang="en-US" dirty="0"/>
-          </a:p>
-        </p:txBody>
-      </p:sp>
-    </p:spTree>
-    <p:extLst>
-      <p:ext uri="{BB962C8B-B14F-4D97-AF65-F5344CB8AC3E}">
-        <p14:creationId xmlns:p14="http://schemas.microsoft.com/office/powerpoint/2010/main" val="577391825"/>
-      </p:ext>
-    </p:extLst>
-  </p:cSld>
-  <p:clrMapOvr>
-    <a:masterClrMapping/>
-  </p:clrMapOvr>
-</p:sld>
-</file>
-
-<file path=ppt/slides/slide20.xml><?xml version="1.0" encoding="utf-8"?>
+<file path=ppt/slides/slide28.xml><?xml version="1.0" encoding="utf-8"?>
 <p:sld xmlns:a="http://schemas.openxmlformats.org/drawingml/2006/main" xmlns:r="http://schemas.openxmlformats.org/officeDocument/2006/relationships" xmlns:p="http://schemas.openxmlformats.org/presentationml/2006/main">
   <p:cSld>
     <p:spTree>
@@ -4960,7 +6902,7 @@
 </p:sld>
 </file>
 
-<file path=ppt/slides/slide21.xml><?xml version="1.0" encoding="utf-8"?>
+<file path=ppt/slides/slide29.xml><?xml version="1.0" encoding="utf-8"?>
 <p:sld xmlns:a="http://schemas.openxmlformats.org/drawingml/2006/main" xmlns:r="http://schemas.openxmlformats.org/officeDocument/2006/relationships" xmlns:p="http://schemas.openxmlformats.org/presentationml/2006/main">
   <p:cSld>
     <p:spTree>
@@ -5069,7 +7011,163 @@
 </p:sld>
 </file>
 
-<file path=ppt/slides/slide22.xml><?xml version="1.0" encoding="utf-8"?>
+<file path=ppt/slides/slide3.xml><?xml version="1.0" encoding="utf-8"?>
+<p:sld xmlns:a="http://schemas.openxmlformats.org/drawingml/2006/main" xmlns:r="http://schemas.openxmlformats.org/officeDocument/2006/relationships" xmlns:p="http://schemas.openxmlformats.org/presentationml/2006/main">
+  <p:cSld>
+    <p:spTree>
+      <p:nvGrpSpPr>
+        <p:cNvPr id="1" name=""/>
+        <p:cNvGrpSpPr/>
+        <p:nvPr/>
+      </p:nvGrpSpPr>
+      <p:grpSpPr>
+        <a:xfrm>
+          <a:off x="0" y="0"/>
+          <a:ext cx="0" cy="0"/>
+          <a:chOff x="0" y="0"/>
+          <a:chExt cx="0" cy="0"/>
+        </a:xfrm>
+      </p:grpSpPr>
+      <p:sp>
+        <p:nvSpPr>
+          <p:cNvPr id="2" name="Title 1"/>
+          <p:cNvSpPr>
+            <a:spLocks noGrp="1"/>
+          </p:cNvSpPr>
+          <p:nvPr>
+            <p:ph type="title"/>
+          </p:nvPr>
+        </p:nvSpPr>
+        <p:spPr/>
+        <p:txBody>
+          <a:bodyPr/>
+          <a:lstStyle/>
+          <a:p>
+            <a:r>
+              <a:rPr lang="en-US" dirty="0" smtClean="0"/>
+              <a:t>Install </a:t>
+            </a:r>
+            <a:r>
+              <a:rPr lang="en-US" dirty="0" smtClean="0">
+                <a:hlinkClick r:id="rId2"/>
+              </a:rPr>
+              <a:t>TDM-GCC</a:t>
+            </a:r>
+            <a:endParaRPr lang="en-US" dirty="0"/>
+          </a:p>
+        </p:txBody>
+      </p:sp>
+      <p:sp>
+        <p:nvSpPr>
+          <p:cNvPr id="3" name="Content Placeholder 2"/>
+          <p:cNvSpPr>
+            <a:spLocks noGrp="1"/>
+          </p:cNvSpPr>
+          <p:nvPr>
+            <p:ph idx="1"/>
+          </p:nvPr>
+        </p:nvSpPr>
+        <p:spPr>
+          <a:xfrm>
+            <a:off x="838200" y="1825625"/>
+            <a:ext cx="10515600" cy="2389536"/>
+          </a:xfrm>
+        </p:spPr>
+        <p:txBody>
+          <a:bodyPr/>
+          <a:lstStyle/>
+          <a:p>
+            <a:r>
+              <a:rPr lang="en-US" dirty="0" smtClean="0"/>
+              <a:t>Download the </a:t>
+            </a:r>
+            <a:r>
+              <a:rPr lang="en-US" dirty="0" smtClean="0">
+                <a:hlinkClick r:id="rId2"/>
+              </a:rPr>
+              <a:t>TDM-GCC</a:t>
+            </a:r>
+            <a:r>
+              <a:rPr lang="en-US" dirty="0" smtClean="0"/>
+              <a:t> zip and extract it.</a:t>
+            </a:r>
+          </a:p>
+          <a:p>
+            <a:r>
+              <a:rPr lang="en-US" dirty="0" smtClean="0"/>
+              <a:t>In the examples below, we will assume it is extracted into: C:\TDM-GCC-64</a:t>
+            </a:r>
+          </a:p>
+          <a:p>
+            <a:r>
+              <a:rPr lang="en-US" dirty="0" smtClean="0"/>
+              <a:t>Keep the location of bin sub folder of the extracted folder. </a:t>
+            </a:r>
+          </a:p>
+          <a:p>
+            <a:pPr lvl="1"/>
+            <a:r>
+              <a:rPr lang="en-US" dirty="0" smtClean="0"/>
+              <a:t>In the examples below we will assume it is: </a:t>
+            </a:r>
+            <a:r>
+              <a:rPr lang="en-US" b="1" dirty="0" smtClean="0"/>
+              <a:t>C:\TDM-GCC-64\bin</a:t>
+            </a:r>
+          </a:p>
+          <a:p>
+            <a:pPr lvl="1"/>
+            <a:endParaRPr lang="en-US" dirty="0" smtClean="0"/>
+          </a:p>
+          <a:p>
+            <a:pPr lvl="1"/>
+            <a:endParaRPr lang="en-US" dirty="0" smtClean="0"/>
+          </a:p>
+          <a:p>
+            <a:endParaRPr lang="en-US" dirty="0" smtClean="0"/>
+          </a:p>
+          <a:p>
+            <a:endParaRPr lang="en-US" dirty="0"/>
+          </a:p>
+        </p:txBody>
+      </p:sp>
+      <p:pic>
+        <p:nvPicPr>
+          <p:cNvPr id="4" name="Picture 3"/>
+          <p:cNvPicPr>
+            <a:picLocks noChangeAspect="1"/>
+          </p:cNvPicPr>
+          <p:nvPr/>
+        </p:nvPicPr>
+        <p:blipFill rotWithShape="1">
+          <a:blip r:embed="rId3"/>
+          <a:srcRect r="31528" b="43549"/>
+          <a:stretch/>
+        </p:blipFill>
+        <p:spPr>
+          <a:xfrm>
+            <a:off x="1769671" y="4215161"/>
+            <a:ext cx="7058043" cy="2374087"/>
+          </a:xfrm>
+          <a:prstGeom prst="rect">
+            <a:avLst/>
+          </a:prstGeom>
+        </p:spPr>
+      </p:pic>
+    </p:spTree>
+    <p:extLst>
+      <p:ext uri="{BB962C8B-B14F-4D97-AF65-F5344CB8AC3E}">
+        <p14:creationId xmlns:p14="http://schemas.microsoft.com/office/powerpoint/2010/main" val="3912965753"/>
+      </p:ext>
+    </p:extLst>
+  </p:cSld>
+  <p:clrMapOvr>
+    <a:masterClrMapping/>
+  </p:clrMapOvr>
+</p:sld>
+</file>
+
+<file path=ppt/slides/slide30.xml><?xml version="1.0" encoding="utf-8"?>
 <p:sld xmlns:a="http://schemas.openxmlformats.org/drawingml/2006/main" xmlns:r="http://schemas.openxmlformats.org/officeDocument/2006/relationships" xmlns:p="http://schemas.openxmlformats.org/presentationml/2006/main">
   <p:cSld>
     <p:spTree>
@@ -5158,7 +7256,7 @@
 </p:sld>
 </file>
 
-<file path=ppt/slides/slide23.xml><?xml version="1.0" encoding="utf-8"?>
+<file path=ppt/slides/slide31.xml><?xml version="1.0" encoding="utf-8"?>
 <p:sld xmlns:a="http://schemas.openxmlformats.org/drawingml/2006/main" xmlns:r="http://schemas.openxmlformats.org/officeDocument/2006/relationships" xmlns:p="http://schemas.openxmlformats.org/presentationml/2006/main">
   <p:cSld>
     <p:spTree>
@@ -5243,7 +7341,7 @@
 </p:sld>
 </file>
 
-<file path=ppt/slides/slide24.xml><?xml version="1.0" encoding="utf-8"?>
+<file path=ppt/slides/slide32.xml><?xml version="1.0" encoding="utf-8"?>
 <p:sld xmlns:a="http://schemas.openxmlformats.org/drawingml/2006/main" xmlns:r="http://schemas.openxmlformats.org/officeDocument/2006/relationships" xmlns:p="http://schemas.openxmlformats.org/presentationml/2006/main">
   <p:cSld>
     <p:spTree>
@@ -5320,7 +7418,7 @@
 </p:sld>
 </file>
 
-<file path=ppt/slides/slide25.xml><?xml version="1.0" encoding="utf-8"?>
+<file path=ppt/slides/slide33.xml><?xml version="1.0" encoding="utf-8"?>
 <p:sld xmlns:a="http://schemas.openxmlformats.org/drawingml/2006/main" xmlns:r="http://schemas.openxmlformats.org/officeDocument/2006/relationships" xmlns:p="http://schemas.openxmlformats.org/presentationml/2006/main">
   <p:cSld>
     <p:spTree>
@@ -5396,7 +7494,7 @@
 </p:sld>
 </file>
 
-<file path=ppt/slides/slide26.xml><?xml version="1.0" encoding="utf-8"?>
+<file path=ppt/slides/slide34.xml><?xml version="1.0" encoding="utf-8"?>
 <p:sld xmlns:a="http://schemas.openxmlformats.org/drawingml/2006/main" xmlns:r="http://schemas.openxmlformats.org/officeDocument/2006/relationships" xmlns:p="http://schemas.openxmlformats.org/presentationml/2006/main">
   <p:cSld>
     <p:spTree>
@@ -5472,7 +7570,7 @@
 </p:sld>
 </file>
 
-<file path=ppt/slides/slide27.xml><?xml version="1.0" encoding="utf-8"?>
+<file path=ppt/slides/slide35.xml><?xml version="1.0" encoding="utf-8"?>
 <p:sld xmlns:a="http://schemas.openxmlformats.org/drawingml/2006/main" xmlns:r="http://schemas.openxmlformats.org/officeDocument/2006/relationships" xmlns:p="http://schemas.openxmlformats.org/presentationml/2006/main">
   <p:cSld>
     <p:spTree>
@@ -5548,7 +7646,7 @@
 </p:sld>
 </file>
 
-<file path=ppt/slides/slide28.xml><?xml version="1.0" encoding="utf-8"?>
+<file path=ppt/slides/slide36.xml><?xml version="1.0" encoding="utf-8"?>
 <p:sld xmlns:a="http://schemas.openxmlformats.org/drawingml/2006/main" xmlns:r="http://schemas.openxmlformats.org/officeDocument/2006/relationships" xmlns:p="http://schemas.openxmlformats.org/presentationml/2006/main">
   <p:cSld>
     <p:spTree>
@@ -5625,7 +7723,7 @@
 </p:sld>
 </file>
 
-<file path=ppt/slides/slide29.xml><?xml version="1.0" encoding="utf-8"?>
+<file path=ppt/slides/slide37.xml><?xml version="1.0" encoding="utf-8"?>
 <p:sld xmlns:a="http://schemas.openxmlformats.org/drawingml/2006/main" xmlns:r="http://schemas.openxmlformats.org/officeDocument/2006/relationships" xmlns:p="http://schemas.openxmlformats.org/presentationml/2006/main">
   <p:cSld>
     <p:spTree>
@@ -5844,7 +7942,7 @@
 </p:sld>
 </file>
 
-<file path=ppt/slides/slide3.xml><?xml version="1.0" encoding="utf-8"?>
+<file path=ppt/slides/slide38.xml><?xml version="1.0" encoding="utf-8"?>
 <p:sld xmlns:a="http://schemas.openxmlformats.org/drawingml/2006/main" xmlns:r="http://schemas.openxmlformats.org/officeDocument/2006/relationships" xmlns:p="http://schemas.openxmlformats.org/presentationml/2006/main">
   <p:cSld>
     <p:spTree>
@@ -5878,89 +7976,280 @@
           <a:p>
             <a:r>
               <a:rPr lang="en-US" dirty="0" smtClean="0"/>
-              <a:t>Install </a:t>
-            </a:r>
-            <a:r>
-              <a:rPr lang="en-US" dirty="0" smtClean="0">
-                <a:hlinkClick r:id="rId2"/>
-              </a:rPr>
-              <a:t>TDM-GCC</a:t>
+              <a:t>Getting to View to Record Difficulties</a:t>
             </a:r>
             <a:endParaRPr lang="en-US" dirty="0"/>
           </a:p>
         </p:txBody>
       </p:sp>
-      <p:sp>
-        <p:nvSpPr>
-          <p:cNvPr id="3" name="Content Placeholder 2"/>
-          <p:cNvSpPr>
-            <a:spLocks noGrp="1"/>
-          </p:cNvSpPr>
-          <p:nvPr>
-            <p:ph idx="1"/>
-          </p:nvPr>
-        </p:nvSpPr>
+      <p:pic>
+        <p:nvPicPr>
+          <p:cNvPr id="3" name="Picture 2"/>
+          <p:cNvPicPr>
+            <a:picLocks noChangeAspect="1"/>
+          </p:cNvPicPr>
+          <p:nvPr/>
+        </p:nvPicPr>
+        <p:blipFill>
+          <a:blip r:embed="rId2"/>
+          <a:stretch>
+            <a:fillRect/>
+          </a:stretch>
+        </p:blipFill>
         <p:spPr>
           <a:xfrm>
-            <a:off x="838200" y="1825625"/>
-            <a:ext cx="10515600" cy="2389536"/>
+            <a:off x="1669656" y="1066801"/>
+            <a:ext cx="8547889" cy="4897821"/>
           </a:xfrm>
+          <a:prstGeom prst="rect">
+            <a:avLst/>
+          </a:prstGeom>
         </p:spPr>
+      </p:pic>
+      <p:sp>
+        <p:nvSpPr>
+          <p:cNvPr id="5" name="Rectangle 4"/>
+          <p:cNvSpPr/>
+          <p:nvPr/>
+        </p:nvSpPr>
+        <p:spPr>
+          <a:xfrm>
+            <a:off x="1697246" y="3102610"/>
+            <a:ext cx="2569955" cy="826200"/>
+          </a:xfrm>
+          <a:prstGeom prst="rect">
+            <a:avLst/>
+          </a:prstGeom>
+        </p:spPr>
+        <p:style>
+          <a:lnRef idx="1">
+            <a:schemeClr val="accent1"/>
+          </a:lnRef>
+          <a:fillRef idx="2">
+            <a:schemeClr val="accent1"/>
+          </a:fillRef>
+          <a:effectRef idx="1">
+            <a:schemeClr val="accent1"/>
+          </a:effectRef>
+          <a:fontRef idx="minor">
+            <a:schemeClr val="dk1"/>
+          </a:fontRef>
+        </p:style>
+        <p:txBody>
+          <a:bodyPr wrap="square" lIns="45720" rIns="45720" rtlCol="0" anchor="ctr">
+            <a:noAutofit/>
+          </a:bodyPr>
+          <a:lstStyle/>
+          <a:p>
+            <a:pPr algn="ctr"/>
+            <a:r>
+              <a:rPr lang="en-US" dirty="0" err="1">
+                <a:latin typeface="Calibri" pitchFamily="34" charset="0"/>
+                <a:cs typeface="Calibri" pitchFamily="34" charset="0"/>
+              </a:rPr>
+              <a:t>Window</a:t>
+            </a:r>
+            <a:r>
+              <a:rPr lang="en-US" dirty="0" err="1">
+                <a:latin typeface="Calibri" pitchFamily="34" charset="0"/>
+                <a:cs typeface="Calibri" pitchFamily="34" charset="0"/>
+                <a:sym typeface="Wingdings" panose="05000000000000000000" pitchFamily="2" charset="2"/>
+              </a:rPr>
+              <a:t>Others</a:t>
+            </a:r>
+            <a:endParaRPr lang="en-US" dirty="0">
+              <a:latin typeface="Calibri" pitchFamily="34" charset="0"/>
+              <a:cs typeface="Calibri" pitchFamily="34" charset="0"/>
+            </a:endParaRPr>
+          </a:p>
+        </p:txBody>
+      </p:sp>
+    </p:spTree>
+    <p:extLst>
+      <p:ext uri="{BB962C8B-B14F-4D97-AF65-F5344CB8AC3E}">
+        <p14:creationId xmlns:p14="http://schemas.microsoft.com/office/powerpoint/2010/main" val="158267050"/>
+      </p:ext>
+    </p:extLst>
+  </p:cSld>
+  <p:clrMapOvr>
+    <a:masterClrMapping/>
+  </p:clrMapOvr>
+  <p:timing>
+    <p:tnLst>
+      <p:par>
+        <p:cTn id="1" dur="indefinite" restart="never" nodeType="tmRoot">
+          <p:childTnLst>
+            <p:seq concurrent="1" nextAc="seek">
+              <p:cTn id="2" dur="indefinite" nodeType="mainSeq">
+                <p:childTnLst>
+                  <p:par>
+                    <p:cTn id="3" fill="hold">
+                      <p:stCondLst>
+                        <p:cond delay="indefinite"/>
+                      </p:stCondLst>
+                      <p:childTnLst>
+                        <p:par>
+                          <p:cTn id="4" fill="hold">
+                            <p:stCondLst>
+                              <p:cond delay="0"/>
+                            </p:stCondLst>
+                            <p:childTnLst>
+                              <p:par>
+                                <p:cTn id="5" presetID="1" presetClass="entr" presetSubtype="0" fill="hold" grpId="0" nodeType="clickEffect">
+                                  <p:stCondLst>
+                                    <p:cond delay="0"/>
+                                  </p:stCondLst>
+                                  <p:childTnLst>
+                                    <p:set>
+                                      <p:cBhvr>
+                                        <p:cTn id="6" dur="1" fill="hold">
+                                          <p:stCondLst>
+                                            <p:cond delay="0"/>
+                                          </p:stCondLst>
+                                        </p:cTn>
+                                        <p:tgtEl>
+                                          <p:spTgt spid="5"/>
+                                        </p:tgtEl>
+                                        <p:attrNameLst>
+                                          <p:attrName>style.visibility</p:attrName>
+                                        </p:attrNameLst>
+                                      </p:cBhvr>
+                                      <p:to>
+                                        <p:strVal val="visible"/>
+                                      </p:to>
+                                    </p:set>
+                                  </p:childTnLst>
+                                </p:cTn>
+                              </p:par>
+                            </p:childTnLst>
+                          </p:cTn>
+                        </p:par>
+                      </p:childTnLst>
+                    </p:cTn>
+                  </p:par>
+                </p:childTnLst>
+              </p:cTn>
+              <p:prevCondLst>
+                <p:cond evt="onPrev" delay="0">
+                  <p:tgtEl>
+                    <p:sldTgt/>
+                  </p:tgtEl>
+                </p:cond>
+              </p:prevCondLst>
+              <p:nextCondLst>
+                <p:cond evt="onNext" delay="0">
+                  <p:tgtEl>
+                    <p:sldTgt/>
+                  </p:tgtEl>
+                </p:cond>
+              </p:nextCondLst>
+            </p:seq>
+          </p:childTnLst>
+        </p:cTn>
+      </p:par>
+    </p:tnLst>
+    <p:bldLst>
+      <p:bldP spid="5" grpId="0" animBg="1"/>
+    </p:bldLst>
+  </p:timing>
+</p:sld>
+</file>
+
+<file path=ppt/slides/slide39.xml><?xml version="1.0" encoding="utf-8"?>
+<p:sld xmlns:a="http://schemas.openxmlformats.org/drawingml/2006/main" xmlns:r="http://schemas.openxmlformats.org/officeDocument/2006/relationships" xmlns:p="http://schemas.openxmlformats.org/presentationml/2006/main">
+  <p:cSld>
+    <p:spTree>
+      <p:nvGrpSpPr>
+        <p:cNvPr id="1" name=""/>
+        <p:cNvGrpSpPr/>
+        <p:nvPr/>
+      </p:nvGrpSpPr>
+      <p:grpSpPr>
+        <a:xfrm>
+          <a:off x="0" y="0"/>
+          <a:ext cx="0" cy="0"/>
+          <a:chOff x="0" y="0"/>
+          <a:chExt cx="0" cy="0"/>
+        </a:xfrm>
+      </p:grpSpPr>
+      <p:sp>
+        <p:nvSpPr>
+          <p:cNvPr id="2" name="Title 1"/>
+          <p:cNvSpPr>
+            <a:spLocks noGrp="1"/>
+          </p:cNvSpPr>
+          <p:nvPr>
+            <p:ph type="title"/>
+          </p:nvPr>
+        </p:nvSpPr>
+        <p:spPr/>
         <p:txBody>
           <a:bodyPr/>
           <a:lstStyle/>
           <a:p>
             <a:r>
               <a:rPr lang="en-US" dirty="0" smtClean="0"/>
-              <a:t>Download the </a:t>
-            </a:r>
-            <a:r>
-              <a:rPr lang="en-US" dirty="0" smtClean="0">
-                <a:hlinkClick r:id="rId2"/>
+              <a:t>Open View</a:t>
+            </a:r>
+            <a:endParaRPr lang="en-US" dirty="0"/>
+          </a:p>
+        </p:txBody>
+      </p:sp>
+      <p:sp>
+        <p:nvSpPr>
+          <p:cNvPr id="5" name="Rectangle 4"/>
+          <p:cNvSpPr/>
+          <p:nvPr/>
+        </p:nvSpPr>
+        <p:spPr>
+          <a:xfrm>
+            <a:off x="1752601" y="3102609"/>
+            <a:ext cx="2569955" cy="826200"/>
+          </a:xfrm>
+          <a:prstGeom prst="rect">
+            <a:avLst/>
+          </a:prstGeom>
+        </p:spPr>
+        <p:style>
+          <a:lnRef idx="1">
+            <a:schemeClr val="accent1"/>
+          </a:lnRef>
+          <a:fillRef idx="2">
+            <a:schemeClr val="accent1"/>
+          </a:fillRef>
+          <a:effectRef idx="1">
+            <a:schemeClr val="accent1"/>
+          </a:effectRef>
+          <a:fontRef idx="minor">
+            <a:schemeClr val="dk1"/>
+          </a:fontRef>
+        </p:style>
+        <p:txBody>
+          <a:bodyPr wrap="square" lIns="45720" rIns="45720" rtlCol="0" anchor="ctr">
+            <a:noAutofit/>
+          </a:bodyPr>
+          <a:lstStyle/>
+          <a:p>
+            <a:pPr algn="ctr"/>
+            <a:r>
+              <a:rPr lang="en-US" dirty="0" err="1">
+                <a:latin typeface="Calibri" pitchFamily="34" charset="0"/>
+                <a:cs typeface="Calibri" pitchFamily="34" charset="0"/>
               </a:rPr>
-              <a:t>TDM-GCC</a:t>
-            </a:r>
-            <a:r>
-              <a:rPr lang="en-US" dirty="0" smtClean="0"/>
-              <a:t> zip and extract it.</a:t>
-            </a:r>
-          </a:p>
-          <a:p>
-            <a:r>
-              <a:rPr lang="en-US" dirty="0" smtClean="0"/>
-              <a:t>In the examples below, we will assume it is extracted into: C:\TDM-GCC-64</a:t>
-            </a:r>
-          </a:p>
-          <a:p>
-            <a:r>
-              <a:rPr lang="en-US" dirty="0" smtClean="0"/>
-              <a:t>Keep the location of bin sub folder of the extracted folder. </a:t>
-            </a:r>
-          </a:p>
-          <a:p>
-            <a:pPr lvl="1"/>
-            <a:r>
-              <a:rPr lang="en-US" dirty="0" smtClean="0"/>
-              <a:t>In the examples below we will assume it is: </a:t>
-            </a:r>
-            <a:r>
-              <a:rPr lang="en-US" b="1" dirty="0" smtClean="0"/>
-              <a:t>C:\TDM-GCC-64\bin</a:t>
-            </a:r>
-          </a:p>
-          <a:p>
-            <a:pPr lvl="1"/>
-            <a:endParaRPr lang="en-US" dirty="0" smtClean="0"/>
-          </a:p>
-          <a:p>
-            <a:pPr lvl="1"/>
-            <a:endParaRPr lang="en-US" dirty="0" smtClean="0"/>
-          </a:p>
-          <a:p>
-            <a:endParaRPr lang="en-US" dirty="0" smtClean="0"/>
-          </a:p>
-          <a:p>
-            <a:endParaRPr lang="en-US" dirty="0"/>
+              <a:t>Hermes</a:t>
+            </a:r>
+            <a:r>
+              <a:rPr lang="en-US" dirty="0" err="1">
+                <a:latin typeface="Calibri" pitchFamily="34" charset="0"/>
+                <a:cs typeface="Calibri" pitchFamily="34" charset="0"/>
+                <a:sym typeface="Wingdings" panose="05000000000000000000" pitchFamily="2" charset="2"/>
+              </a:rPr>
+              <a:t>DifficultyStatus</a:t>
+            </a:r>
+            <a:endParaRPr lang="en-US" dirty="0">
+              <a:latin typeface="Calibri" pitchFamily="34" charset="0"/>
+              <a:cs typeface="Calibri" pitchFamily="34" charset="0"/>
+            </a:endParaRPr>
           </a:p>
         </p:txBody>
       </p:sp>
@@ -5972,15 +8261,16 @@
           </p:cNvPicPr>
           <p:nvPr/>
         </p:nvPicPr>
-        <p:blipFill rotWithShape="1">
-          <a:blip r:embed="rId3"/>
-          <a:srcRect r="31528" b="43549"/>
-          <a:stretch/>
+        <p:blipFill>
+          <a:blip r:embed="rId2"/>
+          <a:stretch>
+            <a:fillRect/>
+          </a:stretch>
         </p:blipFill>
         <p:spPr>
           <a:xfrm>
-            <a:off x="1769671" y="4215161"/>
-            <a:ext cx="7058043" cy="2374087"/>
+            <a:off x="4419600" y="1466598"/>
+            <a:ext cx="4495800" cy="4924425"/>
           </a:xfrm>
           <a:prstGeom prst="rect">
             <a:avLst/>
@@ -5990,13 +8280,91 @@
     </p:spTree>
     <p:extLst>
       <p:ext uri="{BB962C8B-B14F-4D97-AF65-F5344CB8AC3E}">
-        <p14:creationId xmlns:p14="http://schemas.microsoft.com/office/powerpoint/2010/main" val="3912965753"/>
+        <p14:creationId xmlns:p14="http://schemas.microsoft.com/office/powerpoint/2010/main" val="2962887934"/>
       </p:ext>
     </p:extLst>
   </p:cSld>
   <p:clrMapOvr>
     <a:masterClrMapping/>
   </p:clrMapOvr>
+  <p:timing>
+    <p:tnLst>
+      <p:par>
+        <p:cTn id="1" dur="indefinite" restart="never" nodeType="tmRoot">
+          <p:childTnLst>
+            <p:seq concurrent="1" nextAc="seek">
+              <p:cTn id="2" dur="indefinite" nodeType="mainSeq">
+                <p:childTnLst>
+                  <p:par>
+                    <p:cTn id="3" fill="hold">
+                      <p:stCondLst>
+                        <p:cond delay="indefinite"/>
+                      </p:stCondLst>
+                      <p:childTnLst>
+                        <p:par>
+                          <p:cTn id="4" fill="hold">
+                            <p:stCondLst>
+                              <p:cond delay="0"/>
+                            </p:stCondLst>
+                            <p:childTnLst>
+                              <p:par>
+                                <p:cTn id="5" presetID="1" presetClass="entr" presetSubtype="0" fill="hold" grpId="0" nodeType="clickEffect">
+                                  <p:stCondLst>
+                                    <p:cond delay="0"/>
+                                  </p:stCondLst>
+                                  <p:childTnLst>
+                                    <p:set>
+                                      <p:cBhvr>
+                                        <p:cTn id="6" dur="1" fill="hold">
+                                          <p:stCondLst>
+                                            <p:cond delay="0"/>
+                                          </p:stCondLst>
+                                        </p:cTn>
+                                        <p:tgtEl>
+                                          <p:spTgt spid="5"/>
+                                        </p:tgtEl>
+                                        <p:attrNameLst>
+                                          <p:attrName>style.visibility</p:attrName>
+                                        </p:attrNameLst>
+                                      </p:cBhvr>
+                                      <p:to>
+                                        <p:strVal val="visible"/>
+                                      </p:to>
+                                    </p:set>
+                                  </p:childTnLst>
+                                </p:cTn>
+                              </p:par>
+                            </p:childTnLst>
+                          </p:cTn>
+                        </p:par>
+                      </p:childTnLst>
+                    </p:cTn>
+                  </p:par>
+                </p:childTnLst>
+              </p:cTn>
+              <p:prevCondLst>
+                <p:cond evt="onPrev" delay="0">
+                  <p:tgtEl>
+                    <p:sldTgt/>
+                  </p:tgtEl>
+                </p:cond>
+              </p:prevCondLst>
+              <p:nextCondLst>
+                <p:cond evt="onNext" delay="0">
+                  <p:tgtEl>
+                    <p:sldTgt/>
+                  </p:tgtEl>
+                </p:cond>
+              </p:nextCondLst>
+            </p:seq>
+          </p:childTnLst>
+        </p:cTn>
+      </p:par>
+    </p:tnLst>
+    <p:bldLst>
+      <p:bldP spid="5" grpId="0" animBg="1"/>
+    </p:bldLst>
+  </p:timing>
 </p:sld>
 </file>
 
@@ -6096,6 +8464,1316 @@
 </p:sld>
 </file>
 
+<file path=ppt/slides/slide40.xml><?xml version="1.0" encoding="utf-8"?>
+<p:sld xmlns:a="http://schemas.openxmlformats.org/drawingml/2006/main" xmlns:r="http://schemas.openxmlformats.org/officeDocument/2006/relationships" xmlns:p="http://schemas.openxmlformats.org/presentationml/2006/main">
+  <p:cSld>
+    <p:spTree>
+      <p:nvGrpSpPr>
+        <p:cNvPr id="1" name=""/>
+        <p:cNvGrpSpPr/>
+        <p:nvPr/>
+      </p:nvGrpSpPr>
+      <p:grpSpPr>
+        <a:xfrm>
+          <a:off x="0" y="0"/>
+          <a:ext cx="0" cy="0"/>
+          <a:chOff x="0" y="0"/>
+          <a:chExt cx="0" cy="0"/>
+        </a:xfrm>
+      </p:grpSpPr>
+      <p:sp>
+        <p:nvSpPr>
+          <p:cNvPr id="2" name="Title 1"/>
+          <p:cNvSpPr>
+            <a:spLocks noGrp="1"/>
+          </p:cNvSpPr>
+          <p:nvPr>
+            <p:ph type="title"/>
+          </p:nvPr>
+        </p:nvSpPr>
+        <p:spPr/>
+        <p:txBody>
+          <a:bodyPr/>
+          <a:lstStyle/>
+          <a:p>
+            <a:r>
+              <a:rPr lang="en-US" dirty="0" smtClean="0"/>
+              <a:t>Difficulty Status View</a:t>
+            </a:r>
+            <a:endParaRPr lang="en-US" dirty="0"/>
+          </a:p>
+        </p:txBody>
+      </p:sp>
+      <p:pic>
+        <p:nvPicPr>
+          <p:cNvPr id="3" name="Picture 2"/>
+          <p:cNvPicPr>
+            <a:picLocks noChangeAspect="1"/>
+          </p:cNvPicPr>
+          <p:nvPr/>
+        </p:nvPicPr>
+        <p:blipFill>
+          <a:blip r:embed="rId2"/>
+          <a:stretch>
+            <a:fillRect/>
+          </a:stretch>
+        </p:blipFill>
+        <p:spPr>
+          <a:xfrm>
+            <a:off x="2514601" y="1289122"/>
+            <a:ext cx="7846265" cy="4495800"/>
+          </a:xfrm>
+          <a:prstGeom prst="rect">
+            <a:avLst/>
+          </a:prstGeom>
+        </p:spPr>
+      </p:pic>
+      <p:sp>
+        <p:nvSpPr>
+          <p:cNvPr id="6" name="Rectangle 5"/>
+          <p:cNvSpPr/>
+          <p:nvPr/>
+        </p:nvSpPr>
+        <p:spPr>
+          <a:xfrm>
+            <a:off x="1660072" y="1855105"/>
+            <a:ext cx="3234225" cy="826200"/>
+          </a:xfrm>
+          <a:prstGeom prst="rect">
+            <a:avLst/>
+          </a:prstGeom>
+        </p:spPr>
+        <p:style>
+          <a:lnRef idx="1">
+            <a:schemeClr val="accent1"/>
+          </a:lnRef>
+          <a:fillRef idx="2">
+            <a:schemeClr val="accent1"/>
+          </a:fillRef>
+          <a:effectRef idx="1">
+            <a:schemeClr val="accent1"/>
+          </a:effectRef>
+          <a:fontRef idx="minor">
+            <a:schemeClr val="dk1"/>
+          </a:fontRef>
+        </p:style>
+        <p:txBody>
+          <a:bodyPr wrap="square" lIns="45720" rIns="45720" rtlCol="0" anchor="ctr">
+            <a:noAutofit/>
+          </a:bodyPr>
+          <a:lstStyle/>
+          <a:p>
+            <a:pPr algn="ctr"/>
+            <a:r>
+              <a:rPr lang="en-US" dirty="0">
+                <a:latin typeface="Calibri" pitchFamily="34" charset="0"/>
+                <a:cs typeface="Calibri" pitchFamily="34" charset="0"/>
+              </a:rPr>
+              <a:t>When in Difficulty, press surmountable or insurmountable difficulty.</a:t>
+            </a:r>
+          </a:p>
+        </p:txBody>
+      </p:sp>
+      <p:sp>
+        <p:nvSpPr>
+          <p:cNvPr id="7" name="Rectangle 6"/>
+          <p:cNvSpPr/>
+          <p:nvPr/>
+        </p:nvSpPr>
+        <p:spPr>
+          <a:xfrm>
+            <a:off x="1617694" y="5731051"/>
+            <a:ext cx="6154706" cy="974549"/>
+          </a:xfrm>
+          <a:prstGeom prst="rect">
+            <a:avLst/>
+          </a:prstGeom>
+        </p:spPr>
+        <p:style>
+          <a:lnRef idx="1">
+            <a:schemeClr val="accent1"/>
+          </a:lnRef>
+          <a:fillRef idx="2">
+            <a:schemeClr val="accent1"/>
+          </a:fillRef>
+          <a:effectRef idx="1">
+            <a:schemeClr val="accent1"/>
+          </a:effectRef>
+          <a:fontRef idx="minor">
+            <a:schemeClr val="dk1"/>
+          </a:fontRef>
+        </p:style>
+        <p:txBody>
+          <a:bodyPr wrap="square" lIns="45720" rIns="45720" rtlCol="0" anchor="ctr">
+            <a:noAutofit/>
+          </a:bodyPr>
+          <a:lstStyle/>
+          <a:p>
+            <a:pPr algn="ctr"/>
+            <a:r>
+              <a:rPr lang="en-US" dirty="0">
+                <a:latin typeface="Calibri" pitchFamily="34" charset="0"/>
+                <a:cs typeface="Calibri" pitchFamily="34" charset="0"/>
+              </a:rPr>
+              <a:t>Insurmountable: After having thought about it, you have no clue right now on how to solve the problem and are stopping to ask for help or think later</a:t>
+            </a:r>
+          </a:p>
+        </p:txBody>
+      </p:sp>
+      <p:sp>
+        <p:nvSpPr>
+          <p:cNvPr id="8" name="Rectangle 7"/>
+          <p:cNvSpPr/>
+          <p:nvPr/>
+        </p:nvSpPr>
+        <p:spPr>
+          <a:xfrm>
+            <a:off x="1660072" y="4268493"/>
+            <a:ext cx="3243943" cy="1283400"/>
+          </a:xfrm>
+          <a:prstGeom prst="rect">
+            <a:avLst/>
+          </a:prstGeom>
+        </p:spPr>
+        <p:style>
+          <a:lnRef idx="1">
+            <a:schemeClr val="accent1"/>
+          </a:lnRef>
+          <a:fillRef idx="2">
+            <a:schemeClr val="accent1"/>
+          </a:fillRef>
+          <a:effectRef idx="1">
+            <a:schemeClr val="accent1"/>
+          </a:effectRef>
+          <a:fontRef idx="minor">
+            <a:schemeClr val="dk1"/>
+          </a:fontRef>
+        </p:style>
+        <p:txBody>
+          <a:bodyPr wrap="square" lIns="45720" rIns="45720" rtlCol="0" anchor="ctr">
+            <a:noAutofit/>
+          </a:bodyPr>
+          <a:lstStyle/>
+          <a:p>
+            <a:pPr algn="ctr"/>
+            <a:r>
+              <a:rPr lang="en-US" dirty="0">
+                <a:latin typeface="Calibri" pitchFamily="34" charset="0"/>
+                <a:cs typeface="Calibri" pitchFamily="34" charset="0"/>
+              </a:rPr>
+              <a:t>Surmountable: After having thought about it, you have some ideas on how the difficulty may be solved, but do not know the exact solution</a:t>
+            </a:r>
+          </a:p>
+        </p:txBody>
+      </p:sp>
+      <p:sp>
+        <p:nvSpPr>
+          <p:cNvPr id="9" name="Rectangle 8"/>
+          <p:cNvSpPr/>
+          <p:nvPr/>
+        </p:nvSpPr>
+        <p:spPr>
+          <a:xfrm>
+            <a:off x="1650353" y="2805935"/>
+            <a:ext cx="3243943" cy="1283400"/>
+          </a:xfrm>
+          <a:prstGeom prst="rect">
+            <a:avLst/>
+          </a:prstGeom>
+        </p:spPr>
+        <p:style>
+          <a:lnRef idx="1">
+            <a:schemeClr val="accent1"/>
+          </a:lnRef>
+          <a:fillRef idx="2">
+            <a:schemeClr val="accent1"/>
+          </a:fillRef>
+          <a:effectRef idx="1">
+            <a:schemeClr val="accent1"/>
+          </a:effectRef>
+          <a:fontRef idx="minor">
+            <a:schemeClr val="dk1"/>
+          </a:fontRef>
+        </p:style>
+        <p:txBody>
+          <a:bodyPr wrap="square" lIns="45720" rIns="45720" rtlCol="0" anchor="ctr">
+            <a:noAutofit/>
+          </a:bodyPr>
+          <a:lstStyle/>
+          <a:p>
+            <a:pPr algn="ctr"/>
+            <a:r>
+              <a:rPr lang="en-US" dirty="0">
+                <a:latin typeface="Calibri" pitchFamily="34" charset="0"/>
+                <a:cs typeface="Calibri" pitchFamily="34" charset="0"/>
+              </a:rPr>
+              <a:t>Progress: After having thought about it, you know exactly what to do (normal mode, no difficulty)</a:t>
+            </a:r>
+          </a:p>
+        </p:txBody>
+      </p:sp>
+    </p:spTree>
+    <p:extLst>
+      <p:ext uri="{BB962C8B-B14F-4D97-AF65-F5344CB8AC3E}">
+        <p14:creationId xmlns:p14="http://schemas.microsoft.com/office/powerpoint/2010/main" val="784580706"/>
+      </p:ext>
+    </p:extLst>
+  </p:cSld>
+  <p:clrMapOvr>
+    <a:masterClrMapping/>
+  </p:clrMapOvr>
+  <p:timing>
+    <p:tnLst>
+      <p:par>
+        <p:cTn id="1" dur="indefinite" restart="never" nodeType="tmRoot">
+          <p:childTnLst>
+            <p:seq concurrent="1" nextAc="seek">
+              <p:cTn id="2" dur="indefinite" nodeType="mainSeq">
+                <p:childTnLst>
+                  <p:par>
+                    <p:cTn id="3" fill="hold">
+                      <p:stCondLst>
+                        <p:cond delay="indefinite"/>
+                      </p:stCondLst>
+                      <p:childTnLst>
+                        <p:par>
+                          <p:cTn id="4" fill="hold">
+                            <p:stCondLst>
+                              <p:cond delay="0"/>
+                            </p:stCondLst>
+                            <p:childTnLst>
+                              <p:par>
+                                <p:cTn id="5" presetID="1" presetClass="entr" presetSubtype="0" fill="hold" grpId="0" nodeType="clickEffect">
+                                  <p:stCondLst>
+                                    <p:cond delay="0"/>
+                                  </p:stCondLst>
+                                  <p:childTnLst>
+                                    <p:set>
+                                      <p:cBhvr>
+                                        <p:cTn id="6" dur="1" fill="hold">
+                                          <p:stCondLst>
+                                            <p:cond delay="0"/>
+                                          </p:stCondLst>
+                                        </p:cTn>
+                                        <p:tgtEl>
+                                          <p:spTgt spid="6"/>
+                                        </p:tgtEl>
+                                        <p:attrNameLst>
+                                          <p:attrName>style.visibility</p:attrName>
+                                        </p:attrNameLst>
+                                      </p:cBhvr>
+                                      <p:to>
+                                        <p:strVal val="visible"/>
+                                      </p:to>
+                                    </p:set>
+                                  </p:childTnLst>
+                                </p:cTn>
+                              </p:par>
+                            </p:childTnLst>
+                          </p:cTn>
+                        </p:par>
+                      </p:childTnLst>
+                    </p:cTn>
+                  </p:par>
+                  <p:par>
+                    <p:cTn id="7" fill="hold">
+                      <p:stCondLst>
+                        <p:cond delay="indefinite"/>
+                      </p:stCondLst>
+                      <p:childTnLst>
+                        <p:par>
+                          <p:cTn id="8" fill="hold">
+                            <p:stCondLst>
+                              <p:cond delay="0"/>
+                            </p:stCondLst>
+                            <p:childTnLst>
+                              <p:par>
+                                <p:cTn id="9" presetID="1" presetClass="entr" presetSubtype="0" fill="hold" grpId="0" nodeType="clickEffect">
+                                  <p:stCondLst>
+                                    <p:cond delay="0"/>
+                                  </p:stCondLst>
+                                  <p:childTnLst>
+                                    <p:set>
+                                      <p:cBhvr>
+                                        <p:cTn id="10" dur="1" fill="hold">
+                                          <p:stCondLst>
+                                            <p:cond delay="0"/>
+                                          </p:stCondLst>
+                                        </p:cTn>
+                                        <p:tgtEl>
+                                          <p:spTgt spid="7"/>
+                                        </p:tgtEl>
+                                        <p:attrNameLst>
+                                          <p:attrName>style.visibility</p:attrName>
+                                        </p:attrNameLst>
+                                      </p:cBhvr>
+                                      <p:to>
+                                        <p:strVal val="visible"/>
+                                      </p:to>
+                                    </p:set>
+                                  </p:childTnLst>
+                                </p:cTn>
+                              </p:par>
+                            </p:childTnLst>
+                          </p:cTn>
+                        </p:par>
+                      </p:childTnLst>
+                    </p:cTn>
+                  </p:par>
+                  <p:par>
+                    <p:cTn id="11" fill="hold">
+                      <p:stCondLst>
+                        <p:cond delay="indefinite"/>
+                      </p:stCondLst>
+                      <p:childTnLst>
+                        <p:par>
+                          <p:cTn id="12" fill="hold">
+                            <p:stCondLst>
+                              <p:cond delay="0"/>
+                            </p:stCondLst>
+                            <p:childTnLst>
+                              <p:par>
+                                <p:cTn id="13" presetID="1" presetClass="entr" presetSubtype="0" fill="hold" grpId="0" nodeType="clickEffect">
+                                  <p:stCondLst>
+                                    <p:cond delay="0"/>
+                                  </p:stCondLst>
+                                  <p:childTnLst>
+                                    <p:set>
+                                      <p:cBhvr>
+                                        <p:cTn id="14" dur="1" fill="hold">
+                                          <p:stCondLst>
+                                            <p:cond delay="0"/>
+                                          </p:stCondLst>
+                                        </p:cTn>
+                                        <p:tgtEl>
+                                          <p:spTgt spid="8"/>
+                                        </p:tgtEl>
+                                        <p:attrNameLst>
+                                          <p:attrName>style.visibility</p:attrName>
+                                        </p:attrNameLst>
+                                      </p:cBhvr>
+                                      <p:to>
+                                        <p:strVal val="visible"/>
+                                      </p:to>
+                                    </p:set>
+                                  </p:childTnLst>
+                                </p:cTn>
+                              </p:par>
+                            </p:childTnLst>
+                          </p:cTn>
+                        </p:par>
+                      </p:childTnLst>
+                    </p:cTn>
+                  </p:par>
+                  <p:par>
+                    <p:cTn id="15" fill="hold">
+                      <p:stCondLst>
+                        <p:cond delay="indefinite"/>
+                      </p:stCondLst>
+                      <p:childTnLst>
+                        <p:par>
+                          <p:cTn id="16" fill="hold">
+                            <p:stCondLst>
+                              <p:cond delay="0"/>
+                            </p:stCondLst>
+                            <p:childTnLst>
+                              <p:par>
+                                <p:cTn id="17" presetID="1" presetClass="entr" presetSubtype="0" fill="hold" grpId="0" nodeType="clickEffect">
+                                  <p:stCondLst>
+                                    <p:cond delay="0"/>
+                                  </p:stCondLst>
+                                  <p:childTnLst>
+                                    <p:set>
+                                      <p:cBhvr>
+                                        <p:cTn id="18" dur="1" fill="hold">
+                                          <p:stCondLst>
+                                            <p:cond delay="0"/>
+                                          </p:stCondLst>
+                                        </p:cTn>
+                                        <p:tgtEl>
+                                          <p:spTgt spid="9"/>
+                                        </p:tgtEl>
+                                        <p:attrNameLst>
+                                          <p:attrName>style.visibility</p:attrName>
+                                        </p:attrNameLst>
+                                      </p:cBhvr>
+                                      <p:to>
+                                        <p:strVal val="visible"/>
+                                      </p:to>
+                                    </p:set>
+                                  </p:childTnLst>
+                                </p:cTn>
+                              </p:par>
+                            </p:childTnLst>
+                          </p:cTn>
+                        </p:par>
+                      </p:childTnLst>
+                    </p:cTn>
+                  </p:par>
+                </p:childTnLst>
+              </p:cTn>
+              <p:prevCondLst>
+                <p:cond evt="onPrev" delay="0">
+                  <p:tgtEl>
+                    <p:sldTgt/>
+                  </p:tgtEl>
+                </p:cond>
+              </p:prevCondLst>
+              <p:nextCondLst>
+                <p:cond evt="onNext" delay="0">
+                  <p:tgtEl>
+                    <p:sldTgt/>
+                  </p:tgtEl>
+                </p:cond>
+              </p:nextCondLst>
+            </p:seq>
+          </p:childTnLst>
+        </p:cTn>
+      </p:par>
+    </p:tnLst>
+    <p:bldLst>
+      <p:bldP spid="6" grpId="0" animBg="1"/>
+      <p:bldP spid="7" grpId="0" animBg="1"/>
+      <p:bldP spid="8" grpId="0" animBg="1"/>
+      <p:bldP spid="9" grpId="0" animBg="1"/>
+    </p:bldLst>
+  </p:timing>
+</p:sld>
+</file>
+
+<file path=ppt/slides/slide41.xml><?xml version="1.0" encoding="utf-8"?>
+<p:sld xmlns:a="http://schemas.openxmlformats.org/drawingml/2006/main" xmlns:r="http://schemas.openxmlformats.org/officeDocument/2006/relationships" xmlns:p="http://schemas.openxmlformats.org/presentationml/2006/main">
+  <p:cSld>
+    <p:spTree>
+      <p:nvGrpSpPr>
+        <p:cNvPr id="1" name=""/>
+        <p:cNvGrpSpPr/>
+        <p:nvPr/>
+      </p:nvGrpSpPr>
+      <p:grpSpPr>
+        <a:xfrm>
+          <a:off x="0" y="0"/>
+          <a:ext cx="0" cy="0"/>
+          <a:chOff x="0" y="0"/>
+          <a:chExt cx="0" cy="0"/>
+        </a:xfrm>
+      </p:grpSpPr>
+      <p:sp>
+        <p:nvSpPr>
+          <p:cNvPr id="2" name="Title 1"/>
+          <p:cNvSpPr>
+            <a:spLocks noGrp="1"/>
+          </p:cNvSpPr>
+          <p:nvPr>
+            <p:ph type="title"/>
+          </p:nvPr>
+        </p:nvSpPr>
+        <p:spPr/>
+        <p:txBody>
+          <a:bodyPr>
+            <a:normAutofit/>
+          </a:bodyPr>
+          <a:lstStyle/>
+          <a:p>
+            <a:r>
+              <a:rPr lang="en-US" dirty="0" smtClean="0"/>
+              <a:t>Elaborate on Surmountable or Insurmountable Difficulty</a:t>
+            </a:r>
+            <a:endParaRPr lang="en-US" dirty="0"/>
+          </a:p>
+        </p:txBody>
+      </p:sp>
+      <p:pic>
+        <p:nvPicPr>
+          <p:cNvPr id="4" name="Picture 3"/>
+          <p:cNvPicPr>
+            <a:picLocks noChangeAspect="1"/>
+          </p:cNvPicPr>
+          <p:nvPr/>
+        </p:nvPicPr>
+        <p:blipFill>
+          <a:blip r:embed="rId2"/>
+          <a:stretch>
+            <a:fillRect/>
+          </a:stretch>
+        </p:blipFill>
+        <p:spPr>
+          <a:xfrm>
+            <a:off x="2514600" y="1524001"/>
+            <a:ext cx="7022688" cy="3228975"/>
+          </a:xfrm>
+          <a:prstGeom prst="rect">
+            <a:avLst/>
+          </a:prstGeom>
+        </p:spPr>
+      </p:pic>
+    </p:spTree>
+    <p:extLst>
+      <p:ext uri="{BB962C8B-B14F-4D97-AF65-F5344CB8AC3E}">
+        <p14:creationId xmlns:p14="http://schemas.microsoft.com/office/powerpoint/2010/main" val="3468722833"/>
+      </p:ext>
+    </p:extLst>
+  </p:cSld>
+  <p:clrMapOvr>
+    <a:masterClrMapping/>
+  </p:clrMapOvr>
+  <p:timing>
+    <p:tnLst>
+      <p:par>
+        <p:cTn id="1" dur="indefinite" restart="never" nodeType="tmRoot"/>
+      </p:par>
+    </p:tnLst>
+  </p:timing>
+</p:sld>
+</file>
+
+<file path=ppt/slides/slide42.xml><?xml version="1.0" encoding="utf-8"?>
+<p:sld xmlns:a="http://schemas.openxmlformats.org/drawingml/2006/main" xmlns:r="http://schemas.openxmlformats.org/officeDocument/2006/relationships" xmlns:p="http://schemas.openxmlformats.org/presentationml/2006/main">
+  <p:cSld>
+    <p:spTree>
+      <p:nvGrpSpPr>
+        <p:cNvPr id="1" name=""/>
+        <p:cNvGrpSpPr/>
+        <p:nvPr/>
+      </p:nvGrpSpPr>
+      <p:grpSpPr>
+        <a:xfrm>
+          <a:off x="0" y="0"/>
+          <a:ext cx="0" cy="0"/>
+          <a:chOff x="0" y="0"/>
+          <a:chExt cx="0" cy="0"/>
+        </a:xfrm>
+      </p:grpSpPr>
+      <p:sp>
+        <p:nvSpPr>
+          <p:cNvPr id="2" name="Title 1"/>
+          <p:cNvSpPr>
+            <a:spLocks noGrp="1"/>
+          </p:cNvSpPr>
+          <p:nvPr>
+            <p:ph type="title"/>
+          </p:nvPr>
+        </p:nvSpPr>
+        <p:spPr/>
+        <p:txBody>
+          <a:bodyPr>
+            <a:normAutofit/>
+          </a:bodyPr>
+          <a:lstStyle/>
+          <a:p>
+            <a:r>
+              <a:rPr lang="en-US" smtClean="0"/>
+              <a:t>Example Filled Form</a:t>
+            </a:r>
+            <a:endParaRPr lang="en-US" dirty="0"/>
+          </a:p>
+        </p:txBody>
+      </p:sp>
+      <p:pic>
+        <p:nvPicPr>
+          <p:cNvPr id="3" name="Picture 2"/>
+          <p:cNvPicPr>
+            <a:picLocks noChangeAspect="1"/>
+          </p:cNvPicPr>
+          <p:nvPr/>
+        </p:nvPicPr>
+        <p:blipFill>
+          <a:blip r:embed="rId2"/>
+          <a:stretch>
+            <a:fillRect/>
+          </a:stretch>
+        </p:blipFill>
+        <p:spPr>
+          <a:xfrm>
+            <a:off x="2362200" y="2209800"/>
+            <a:ext cx="7853362" cy="3484604"/>
+          </a:xfrm>
+          <a:prstGeom prst="rect">
+            <a:avLst/>
+          </a:prstGeom>
+        </p:spPr>
+      </p:pic>
+    </p:spTree>
+    <p:extLst>
+      <p:ext uri="{BB962C8B-B14F-4D97-AF65-F5344CB8AC3E}">
+        <p14:creationId xmlns:p14="http://schemas.microsoft.com/office/powerpoint/2010/main" val="2786797667"/>
+      </p:ext>
+    </p:extLst>
+  </p:cSld>
+  <p:clrMapOvr>
+    <a:masterClrMapping/>
+  </p:clrMapOvr>
+  <p:timing>
+    <p:tnLst>
+      <p:par>
+        <p:cTn id="1" dur="indefinite" restart="never" nodeType="tmRoot"/>
+      </p:par>
+    </p:tnLst>
+  </p:timing>
+</p:sld>
+</file>
+
+<file path=ppt/slides/slide43.xml><?xml version="1.0" encoding="utf-8"?>
+<p:sld xmlns:a="http://schemas.openxmlformats.org/drawingml/2006/main" xmlns:r="http://schemas.openxmlformats.org/officeDocument/2006/relationships" xmlns:p="http://schemas.openxmlformats.org/presentationml/2006/main">
+  <p:cSld>
+    <p:spTree>
+      <p:nvGrpSpPr>
+        <p:cNvPr id="1" name=""/>
+        <p:cNvGrpSpPr/>
+        <p:nvPr/>
+      </p:nvGrpSpPr>
+      <p:grpSpPr>
+        <a:xfrm>
+          <a:off x="0" y="0"/>
+          <a:ext cx="0" cy="0"/>
+          <a:chOff x="0" y="0"/>
+          <a:chExt cx="0" cy="0"/>
+        </a:xfrm>
+      </p:grpSpPr>
+      <p:sp>
+        <p:nvSpPr>
+          <p:cNvPr id="2" name="Title 1"/>
+          <p:cNvSpPr>
+            <a:spLocks noGrp="1"/>
+          </p:cNvSpPr>
+          <p:nvPr>
+            <p:ph type="title"/>
+          </p:nvPr>
+        </p:nvSpPr>
+        <p:spPr/>
+        <p:txBody>
+          <a:bodyPr>
+            <a:normAutofit/>
+          </a:bodyPr>
+          <a:lstStyle/>
+          <a:p>
+            <a:r>
+              <a:rPr lang="en-US" dirty="0" smtClean="0"/>
+              <a:t>Uninstalling Plugin</a:t>
+            </a:r>
+            <a:endParaRPr lang="en-US" dirty="0"/>
+          </a:p>
+        </p:txBody>
+      </p:sp>
+    </p:spTree>
+    <p:extLst>
+      <p:ext uri="{BB962C8B-B14F-4D97-AF65-F5344CB8AC3E}">
+        <p14:creationId xmlns:p14="http://schemas.microsoft.com/office/powerpoint/2010/main" val="2194539927"/>
+      </p:ext>
+    </p:extLst>
+  </p:cSld>
+  <p:clrMapOvr>
+    <a:masterClrMapping/>
+  </p:clrMapOvr>
+  <p:timing>
+    <p:tnLst>
+      <p:par>
+        <p:cTn id="1" dur="indefinite" restart="never" nodeType="tmRoot"/>
+      </p:par>
+    </p:tnLst>
+  </p:timing>
+</p:sld>
+</file>
+
+<file path=ppt/slides/slide44.xml><?xml version="1.0" encoding="utf-8"?>
+<p:sld xmlns:a="http://schemas.openxmlformats.org/drawingml/2006/main" xmlns:r="http://schemas.openxmlformats.org/officeDocument/2006/relationships" xmlns:p="http://schemas.openxmlformats.org/presentationml/2006/main">
+  <p:cSld>
+    <p:spTree>
+      <p:nvGrpSpPr>
+        <p:cNvPr id="1" name=""/>
+        <p:cNvGrpSpPr/>
+        <p:nvPr/>
+      </p:nvGrpSpPr>
+      <p:grpSpPr>
+        <a:xfrm>
+          <a:off x="0" y="0"/>
+          <a:ext cx="0" cy="0"/>
+          <a:chOff x="0" y="0"/>
+          <a:chExt cx="0" cy="0"/>
+        </a:xfrm>
+      </p:grpSpPr>
+      <p:sp>
+        <p:nvSpPr>
+          <p:cNvPr id="2" name="Title 1"/>
+          <p:cNvSpPr>
+            <a:spLocks noGrp="1"/>
+          </p:cNvSpPr>
+          <p:nvPr>
+            <p:ph type="title"/>
+          </p:nvPr>
+        </p:nvSpPr>
+        <p:spPr/>
+        <p:txBody>
+          <a:bodyPr/>
+          <a:lstStyle/>
+          <a:p>
+            <a:r>
+              <a:rPr lang="en-US" dirty="0" err="1" smtClean="0"/>
+              <a:t>Help</a:t>
+            </a:r>
+            <a:r>
+              <a:rPr lang="en-US" dirty="0" err="1" smtClean="0">
+                <a:sym typeface="Wingdings" panose="05000000000000000000" pitchFamily="2" charset="2"/>
+              </a:rPr>
+              <a:t>Install</a:t>
+            </a:r>
+            <a:r>
+              <a:rPr lang="en-US" dirty="0" smtClean="0">
+                <a:sym typeface="Wingdings" panose="05000000000000000000" pitchFamily="2" charset="2"/>
+              </a:rPr>
+              <a:t> New Software</a:t>
+            </a:r>
+            <a:endParaRPr lang="en-US" dirty="0"/>
+          </a:p>
+        </p:txBody>
+      </p:sp>
+      <p:pic>
+        <p:nvPicPr>
+          <p:cNvPr id="5" name="Picture 4"/>
+          <p:cNvPicPr>
+            <a:picLocks noChangeAspect="1"/>
+          </p:cNvPicPr>
+          <p:nvPr/>
+        </p:nvPicPr>
+        <p:blipFill>
+          <a:blip r:embed="rId2"/>
+          <a:stretch>
+            <a:fillRect/>
+          </a:stretch>
+        </p:blipFill>
+        <p:spPr>
+          <a:xfrm>
+            <a:off x="1905000" y="1054846"/>
+            <a:ext cx="8166348" cy="4679204"/>
+          </a:xfrm>
+          <a:prstGeom prst="rect">
+            <a:avLst/>
+          </a:prstGeom>
+        </p:spPr>
+      </p:pic>
+    </p:spTree>
+    <p:extLst>
+      <p:ext uri="{BB962C8B-B14F-4D97-AF65-F5344CB8AC3E}">
+        <p14:creationId xmlns:p14="http://schemas.microsoft.com/office/powerpoint/2010/main" val="2540035276"/>
+      </p:ext>
+    </p:extLst>
+  </p:cSld>
+  <p:clrMapOvr>
+    <a:masterClrMapping/>
+  </p:clrMapOvr>
+  <p:timing>
+    <p:tnLst>
+      <p:par>
+        <p:cTn id="1" dur="indefinite" restart="never" nodeType="tmRoot"/>
+      </p:par>
+    </p:tnLst>
+  </p:timing>
+</p:sld>
+</file>
+
+<file path=ppt/slides/slide45.xml><?xml version="1.0" encoding="utf-8"?>
+<p:sld xmlns:a="http://schemas.openxmlformats.org/drawingml/2006/main" xmlns:r="http://schemas.openxmlformats.org/officeDocument/2006/relationships" xmlns:p="http://schemas.openxmlformats.org/presentationml/2006/main">
+  <p:cSld>
+    <p:spTree>
+      <p:nvGrpSpPr>
+        <p:cNvPr id="1" name=""/>
+        <p:cNvGrpSpPr/>
+        <p:nvPr/>
+      </p:nvGrpSpPr>
+      <p:grpSpPr>
+        <a:xfrm>
+          <a:off x="0" y="0"/>
+          <a:ext cx="0" cy="0"/>
+          <a:chOff x="0" y="0"/>
+          <a:chExt cx="0" cy="0"/>
+        </a:xfrm>
+      </p:grpSpPr>
+      <p:sp>
+        <p:nvSpPr>
+          <p:cNvPr id="2" name="Title 1"/>
+          <p:cNvSpPr>
+            <a:spLocks noGrp="1"/>
+          </p:cNvSpPr>
+          <p:nvPr>
+            <p:ph type="title"/>
+          </p:nvPr>
+        </p:nvSpPr>
+        <p:spPr/>
+        <p:txBody>
+          <a:bodyPr/>
+          <a:lstStyle/>
+          <a:p>
+            <a:r>
+              <a:rPr lang="en-US" dirty="0" smtClean="0"/>
+              <a:t>Click on: </a:t>
+            </a:r>
+            <a:r>
+              <a:rPr lang="en-US" dirty="0"/>
+              <a:t>A</a:t>
+            </a:r>
+            <a:r>
+              <a:rPr lang="en-US" dirty="0" smtClean="0"/>
+              <a:t>lready </a:t>
+            </a:r>
+            <a:r>
+              <a:rPr lang="en-US" dirty="0"/>
+              <a:t>I</a:t>
+            </a:r>
+            <a:r>
+              <a:rPr lang="en-US" dirty="0" smtClean="0"/>
+              <a:t>nstalled</a:t>
+            </a:r>
+            <a:endParaRPr lang="en-US" dirty="0"/>
+          </a:p>
+        </p:txBody>
+      </p:sp>
+      <p:pic>
+        <p:nvPicPr>
+          <p:cNvPr id="3" name="Picture 2"/>
+          <p:cNvPicPr>
+            <a:picLocks noChangeAspect="1"/>
+          </p:cNvPicPr>
+          <p:nvPr/>
+        </p:nvPicPr>
+        <p:blipFill>
+          <a:blip r:embed="rId2"/>
+          <a:stretch>
+            <a:fillRect/>
+          </a:stretch>
+        </p:blipFill>
+        <p:spPr>
+          <a:xfrm>
+            <a:off x="2284693" y="1295400"/>
+            <a:ext cx="7317815" cy="5448300"/>
+          </a:xfrm>
+          <a:prstGeom prst="rect">
+            <a:avLst/>
+          </a:prstGeom>
+        </p:spPr>
+      </p:pic>
+      <p:sp>
+        <p:nvSpPr>
+          <p:cNvPr id="6" name="Rectangle 5"/>
+          <p:cNvSpPr/>
+          <p:nvPr/>
+        </p:nvSpPr>
+        <p:spPr>
+          <a:xfrm>
+            <a:off x="5486400" y="4876800"/>
+            <a:ext cx="2667000" cy="381000"/>
+          </a:xfrm>
+          <a:prstGeom prst="rect">
+            <a:avLst/>
+          </a:prstGeom>
+          <a:noFill/>
+          <a:ln w="28575">
+            <a:solidFill>
+              <a:srgbClr val="FF0000"/>
+            </a:solidFill>
+          </a:ln>
+        </p:spPr>
+        <p:style>
+          <a:lnRef idx="2">
+            <a:schemeClr val="accent2"/>
+          </a:lnRef>
+          <a:fillRef idx="1">
+            <a:schemeClr val="lt1"/>
+          </a:fillRef>
+          <a:effectRef idx="0">
+            <a:schemeClr val="accent2"/>
+          </a:effectRef>
+          <a:fontRef idx="minor">
+            <a:schemeClr val="dk1"/>
+          </a:fontRef>
+        </p:style>
+        <p:txBody>
+          <a:bodyPr lIns="45720" rIns="45720" rtlCol="0" anchor="ctr">
+            <a:spAutoFit/>
+          </a:bodyPr>
+          <a:lstStyle/>
+          <a:p>
+            <a:pPr algn="ctr"/>
+            <a:endParaRPr lang="en-US" dirty="0">
+              <a:latin typeface="Calibri" pitchFamily="34" charset="0"/>
+              <a:cs typeface="Calibri" pitchFamily="34" charset="0"/>
+            </a:endParaRPr>
+          </a:p>
+        </p:txBody>
+      </p:sp>
+    </p:spTree>
+    <p:extLst>
+      <p:ext uri="{BB962C8B-B14F-4D97-AF65-F5344CB8AC3E}">
+        <p14:creationId xmlns:p14="http://schemas.microsoft.com/office/powerpoint/2010/main" val="2535074697"/>
+      </p:ext>
+    </p:extLst>
+  </p:cSld>
+  <p:clrMapOvr>
+    <a:masterClrMapping/>
+  </p:clrMapOvr>
+  <p:timing>
+    <p:tnLst>
+      <p:par>
+        <p:cTn id="1" dur="indefinite" restart="never" nodeType="tmRoot"/>
+      </p:par>
+    </p:tnLst>
+  </p:timing>
+</p:sld>
+</file>
+
+<file path=ppt/slides/slide46.xml><?xml version="1.0" encoding="utf-8"?>
+<p:sld xmlns:a="http://schemas.openxmlformats.org/drawingml/2006/main" xmlns:r="http://schemas.openxmlformats.org/officeDocument/2006/relationships" xmlns:p="http://schemas.openxmlformats.org/presentationml/2006/main">
+  <p:cSld>
+    <p:spTree>
+      <p:nvGrpSpPr>
+        <p:cNvPr id="1" name=""/>
+        <p:cNvGrpSpPr/>
+        <p:nvPr/>
+      </p:nvGrpSpPr>
+      <p:grpSpPr>
+        <a:xfrm>
+          <a:off x="0" y="0"/>
+          <a:ext cx="0" cy="0"/>
+          <a:chOff x="0" y="0"/>
+          <a:chExt cx="0" cy="0"/>
+        </a:xfrm>
+      </p:grpSpPr>
+      <p:pic>
+        <p:nvPicPr>
+          <p:cNvPr id="4" name="Picture 3"/>
+          <p:cNvPicPr>
+            <a:picLocks noChangeAspect="1"/>
+          </p:cNvPicPr>
+          <p:nvPr/>
+        </p:nvPicPr>
+        <p:blipFill>
+          <a:blip r:embed="rId2"/>
+          <a:stretch>
+            <a:fillRect/>
+          </a:stretch>
+        </p:blipFill>
+        <p:spPr>
+          <a:xfrm>
+            <a:off x="2438400" y="1026072"/>
+            <a:ext cx="6315262" cy="5524500"/>
+          </a:xfrm>
+          <a:prstGeom prst="rect">
+            <a:avLst/>
+          </a:prstGeom>
+        </p:spPr>
+      </p:pic>
+      <p:sp>
+        <p:nvSpPr>
+          <p:cNvPr id="2" name="Title 1"/>
+          <p:cNvSpPr>
+            <a:spLocks noGrp="1"/>
+          </p:cNvSpPr>
+          <p:nvPr>
+            <p:ph type="title"/>
+          </p:nvPr>
+        </p:nvSpPr>
+        <p:spPr/>
+        <p:txBody>
+          <a:bodyPr/>
+          <a:lstStyle/>
+          <a:p>
+            <a:r>
+              <a:rPr lang="en-US" dirty="0" err="1" smtClean="0"/>
+              <a:t>HermesFeature</a:t>
+            </a:r>
+            <a:r>
+              <a:rPr lang="en-US" dirty="0" smtClean="0"/>
+              <a:t> Uninstall</a:t>
+            </a:r>
+            <a:endParaRPr lang="en-US" dirty="0"/>
+          </a:p>
+        </p:txBody>
+      </p:sp>
+      <p:sp>
+        <p:nvSpPr>
+          <p:cNvPr id="6" name="Rectangle 5"/>
+          <p:cNvSpPr/>
+          <p:nvPr/>
+        </p:nvSpPr>
+        <p:spPr>
+          <a:xfrm>
+            <a:off x="2743200" y="2596634"/>
+            <a:ext cx="1219200" cy="369332"/>
+          </a:xfrm>
+          <a:prstGeom prst="rect">
+            <a:avLst/>
+          </a:prstGeom>
+          <a:noFill/>
+          <a:ln w="28575">
+            <a:solidFill>
+              <a:srgbClr val="FF0000"/>
+            </a:solidFill>
+          </a:ln>
+        </p:spPr>
+        <p:style>
+          <a:lnRef idx="2">
+            <a:schemeClr val="accent2"/>
+          </a:lnRef>
+          <a:fillRef idx="1">
+            <a:schemeClr val="lt1"/>
+          </a:fillRef>
+          <a:effectRef idx="0">
+            <a:schemeClr val="accent2"/>
+          </a:effectRef>
+          <a:fontRef idx="minor">
+            <a:schemeClr val="dk1"/>
+          </a:fontRef>
+        </p:style>
+        <p:txBody>
+          <a:bodyPr wrap="square" lIns="45720" rIns="45720" rtlCol="0" anchor="ctr">
+            <a:spAutoFit/>
+          </a:bodyPr>
+          <a:lstStyle/>
+          <a:p>
+            <a:pPr algn="ctr"/>
+            <a:endParaRPr lang="en-US" dirty="0">
+              <a:latin typeface="Calibri" pitchFamily="34" charset="0"/>
+              <a:cs typeface="Calibri" pitchFamily="34" charset="0"/>
+            </a:endParaRPr>
+          </a:p>
+        </p:txBody>
+      </p:sp>
+    </p:spTree>
+    <p:extLst>
+      <p:ext uri="{BB962C8B-B14F-4D97-AF65-F5344CB8AC3E}">
+        <p14:creationId xmlns:p14="http://schemas.microsoft.com/office/powerpoint/2010/main" val="2723068322"/>
+      </p:ext>
+    </p:extLst>
+  </p:cSld>
+  <p:clrMapOvr>
+    <a:masterClrMapping/>
+  </p:clrMapOvr>
+  <p:timing>
+    <p:tnLst>
+      <p:par>
+        <p:cTn id="1" dur="indefinite" restart="never" nodeType="tmRoot"/>
+      </p:par>
+    </p:tnLst>
+  </p:timing>
+</p:sld>
+</file>
+
+<file path=ppt/slides/slide47.xml><?xml version="1.0" encoding="utf-8"?>
+<p:sld xmlns:a="http://schemas.openxmlformats.org/drawingml/2006/main" xmlns:r="http://schemas.openxmlformats.org/officeDocument/2006/relationships" xmlns:p="http://schemas.openxmlformats.org/presentationml/2006/main">
+  <p:cSld>
+    <p:spTree>
+      <p:nvGrpSpPr>
+        <p:cNvPr id="1" name=""/>
+        <p:cNvGrpSpPr/>
+        <p:nvPr/>
+      </p:nvGrpSpPr>
+      <p:grpSpPr>
+        <a:xfrm>
+          <a:off x="0" y="0"/>
+          <a:ext cx="0" cy="0"/>
+          <a:chOff x="0" y="0"/>
+          <a:chExt cx="0" cy="0"/>
+        </a:xfrm>
+      </p:grpSpPr>
+      <p:sp>
+        <p:nvSpPr>
+          <p:cNvPr id="2" name="Title 1"/>
+          <p:cNvSpPr>
+            <a:spLocks noGrp="1"/>
+          </p:cNvSpPr>
+          <p:nvPr>
+            <p:ph type="title"/>
+          </p:nvPr>
+        </p:nvSpPr>
+        <p:spPr/>
+        <p:txBody>
+          <a:bodyPr/>
+          <a:lstStyle/>
+          <a:p>
+            <a:r>
+              <a:rPr lang="en-US" dirty="0" smtClean="0"/>
+              <a:t>Click Finish</a:t>
+            </a:r>
+            <a:endParaRPr lang="en-US" dirty="0"/>
+          </a:p>
+        </p:txBody>
+      </p:sp>
+      <p:pic>
+        <p:nvPicPr>
+          <p:cNvPr id="3" name="Picture 2"/>
+          <p:cNvPicPr>
+            <a:picLocks noChangeAspect="1"/>
+          </p:cNvPicPr>
+          <p:nvPr/>
+        </p:nvPicPr>
+        <p:blipFill>
+          <a:blip r:embed="rId2"/>
+          <a:stretch>
+            <a:fillRect/>
+          </a:stretch>
+        </p:blipFill>
+        <p:spPr>
+          <a:xfrm>
+            <a:off x="3059907" y="1219200"/>
+            <a:ext cx="5767387" cy="4930292"/>
+          </a:xfrm>
+          <a:prstGeom prst="rect">
+            <a:avLst/>
+          </a:prstGeom>
+        </p:spPr>
+      </p:pic>
+      <p:sp>
+        <p:nvSpPr>
+          <p:cNvPr id="7" name="Rectangle 6"/>
+          <p:cNvSpPr/>
+          <p:nvPr/>
+        </p:nvSpPr>
+        <p:spPr>
+          <a:xfrm>
+            <a:off x="6400800" y="5627965"/>
+            <a:ext cx="1295400" cy="369332"/>
+          </a:xfrm>
+          <a:prstGeom prst="rect">
+            <a:avLst/>
+          </a:prstGeom>
+          <a:noFill/>
+          <a:ln w="28575">
+            <a:solidFill>
+              <a:srgbClr val="FF0000"/>
+            </a:solidFill>
+          </a:ln>
+        </p:spPr>
+        <p:style>
+          <a:lnRef idx="2">
+            <a:schemeClr val="accent2"/>
+          </a:lnRef>
+          <a:fillRef idx="1">
+            <a:schemeClr val="lt1"/>
+          </a:fillRef>
+          <a:effectRef idx="0">
+            <a:schemeClr val="accent2"/>
+          </a:effectRef>
+          <a:fontRef idx="minor">
+            <a:schemeClr val="dk1"/>
+          </a:fontRef>
+        </p:style>
+        <p:txBody>
+          <a:bodyPr wrap="square" lIns="45720" rIns="45720" rtlCol="0" anchor="ctr">
+            <a:spAutoFit/>
+          </a:bodyPr>
+          <a:lstStyle/>
+          <a:p>
+            <a:pPr algn="ctr"/>
+            <a:endParaRPr lang="en-US" dirty="0">
+              <a:latin typeface="Calibri" pitchFamily="34" charset="0"/>
+              <a:cs typeface="Calibri" pitchFamily="34" charset="0"/>
+            </a:endParaRPr>
+          </a:p>
+        </p:txBody>
+      </p:sp>
+    </p:spTree>
+    <p:extLst>
+      <p:ext uri="{BB962C8B-B14F-4D97-AF65-F5344CB8AC3E}">
+        <p14:creationId xmlns:p14="http://schemas.microsoft.com/office/powerpoint/2010/main" val="898002289"/>
+      </p:ext>
+    </p:extLst>
+  </p:cSld>
+  <p:clrMapOvr>
+    <a:masterClrMapping/>
+  </p:clrMapOvr>
+  <p:timing>
+    <p:tnLst>
+      <p:par>
+        <p:cTn id="1" dur="indefinite" restart="never" nodeType="tmRoot"/>
+      </p:par>
+    </p:tnLst>
+  </p:timing>
+</p:sld>
+</file>
+
+<file path=ppt/slides/slide48.xml><?xml version="1.0" encoding="utf-8"?>
+<p:sld xmlns:a="http://schemas.openxmlformats.org/drawingml/2006/main" xmlns:r="http://schemas.openxmlformats.org/officeDocument/2006/relationships" xmlns:p="http://schemas.openxmlformats.org/presentationml/2006/main">
+  <p:cSld>
+    <p:spTree>
+      <p:nvGrpSpPr>
+        <p:cNvPr id="1" name=""/>
+        <p:cNvGrpSpPr/>
+        <p:nvPr/>
+      </p:nvGrpSpPr>
+      <p:grpSpPr>
+        <a:xfrm>
+          <a:off x="0" y="0"/>
+          <a:ext cx="0" cy="0"/>
+          <a:chOff x="0" y="0"/>
+          <a:chExt cx="0" cy="0"/>
+        </a:xfrm>
+      </p:grpSpPr>
+      <p:sp>
+        <p:nvSpPr>
+          <p:cNvPr id="2" name="Title 1"/>
+          <p:cNvSpPr>
+            <a:spLocks noGrp="1"/>
+          </p:cNvSpPr>
+          <p:nvPr>
+            <p:ph type="title"/>
+          </p:nvPr>
+        </p:nvSpPr>
+        <p:spPr/>
+        <p:txBody>
+          <a:bodyPr/>
+          <a:lstStyle/>
+          <a:p>
+            <a:r>
+              <a:rPr lang="en-US" dirty="0" smtClean="0"/>
+              <a:t>Restart Eclipse</a:t>
+            </a:r>
+            <a:endParaRPr lang="en-US" dirty="0"/>
+          </a:p>
+        </p:txBody>
+      </p:sp>
+      <p:pic>
+        <p:nvPicPr>
+          <p:cNvPr id="4" name="Picture 3"/>
+          <p:cNvPicPr>
+            <a:picLocks noChangeAspect="1"/>
+          </p:cNvPicPr>
+          <p:nvPr/>
+        </p:nvPicPr>
+        <p:blipFill>
+          <a:blip r:embed="rId2"/>
+          <a:stretch>
+            <a:fillRect/>
+          </a:stretch>
+        </p:blipFill>
+        <p:spPr>
+          <a:xfrm>
+            <a:off x="2000250" y="2390775"/>
+            <a:ext cx="8191500" cy="2076450"/>
+          </a:xfrm>
+          <a:prstGeom prst="rect">
+            <a:avLst/>
+          </a:prstGeom>
+        </p:spPr>
+      </p:pic>
+    </p:spTree>
+    <p:extLst>
+      <p:ext uri="{BB962C8B-B14F-4D97-AF65-F5344CB8AC3E}">
+        <p14:creationId xmlns:p14="http://schemas.microsoft.com/office/powerpoint/2010/main" val="3745667196"/>
+      </p:ext>
+    </p:extLst>
+  </p:cSld>
+  <p:clrMapOvr>
+    <a:masterClrMapping/>
+  </p:clrMapOvr>
+  <p:timing>
+    <p:tnLst>
+      <p:par>
+        <p:cTn id="1" dur="indefinite" restart="never" nodeType="tmRoot"/>
+      </p:par>
+    </p:tnLst>
+  </p:timing>
+</p:sld>
+</file>
+
 <file path=ppt/slides/slide5.xml><?xml version="1.0" encoding="utf-8"?>
 <p:sld xmlns:a="http://schemas.openxmlformats.org/drawingml/2006/main" xmlns:r="http://schemas.openxmlformats.org/officeDocument/2006/relationships" xmlns:p="http://schemas.openxmlformats.org/presentationml/2006/main">
   <p:cSld>
@@ -6134,11 +9812,7 @@
             </a:r>
             <a:r>
               <a:rPr lang="en-US" smtClean="0"/>
-              <a:t>: </a:t>
-            </a:r>
-            <a:r>
-              <a:rPr lang="en-US" smtClean="0"/>
-              <a:t>Go </a:t>
+              <a:t>: Go </a:t>
             </a:r>
             <a:r>
               <a:rPr lang="en-US" dirty="0" smtClean="0"/>

</xml_diff>